<commit_message>
Inserted new architecture slides
</commit_message>
<xml_diff>
--- a/OracleJET_TalentLaunch.pptx
+++ b/OracleJET_TalentLaunch.pptx
@@ -5,7 +5,7 @@
     <p:sldMasterId id="2147483672" r:id="rId1"/>
   </p:sldMasterIdLst>
   <p:notesMasterIdLst>
-    <p:notesMasterId r:id="rId107"/>
+    <p:notesMasterId r:id="rId109"/>
   </p:notesMasterIdLst>
   <p:sldIdLst>
     <p:sldId id="282" r:id="rId2"/>
@@ -94,25 +94,27 @@
     <p:sldId id="373" r:id="rId85"/>
     <p:sldId id="307" r:id="rId86"/>
     <p:sldId id="308" r:id="rId87"/>
-    <p:sldId id="366" r:id="rId88"/>
-    <p:sldId id="367" r:id="rId89"/>
-    <p:sldId id="368" r:id="rId90"/>
-    <p:sldId id="309" r:id="rId91"/>
-    <p:sldId id="357" r:id="rId92"/>
-    <p:sldId id="358" r:id="rId93"/>
-    <p:sldId id="359" r:id="rId94"/>
-    <p:sldId id="360" r:id="rId95"/>
-    <p:sldId id="361" r:id="rId96"/>
-    <p:sldId id="362" r:id="rId97"/>
-    <p:sldId id="363" r:id="rId98"/>
-    <p:sldId id="364" r:id="rId99"/>
-    <p:sldId id="310" r:id="rId100"/>
-    <p:sldId id="311" r:id="rId101"/>
-    <p:sldId id="353" r:id="rId102"/>
-    <p:sldId id="354" r:id="rId103"/>
-    <p:sldId id="355" r:id="rId104"/>
-    <p:sldId id="356" r:id="rId105"/>
-    <p:sldId id="316" r:id="rId106"/>
+    <p:sldId id="411" r:id="rId88"/>
+    <p:sldId id="412" r:id="rId89"/>
+    <p:sldId id="413" r:id="rId90"/>
+    <p:sldId id="414" r:id="rId91"/>
+    <p:sldId id="415" r:id="rId92"/>
+    <p:sldId id="309" r:id="rId93"/>
+    <p:sldId id="357" r:id="rId94"/>
+    <p:sldId id="358" r:id="rId95"/>
+    <p:sldId id="359" r:id="rId96"/>
+    <p:sldId id="360" r:id="rId97"/>
+    <p:sldId id="361" r:id="rId98"/>
+    <p:sldId id="362" r:id="rId99"/>
+    <p:sldId id="363" r:id="rId100"/>
+    <p:sldId id="364" r:id="rId101"/>
+    <p:sldId id="310" r:id="rId102"/>
+    <p:sldId id="311" r:id="rId103"/>
+    <p:sldId id="353" r:id="rId104"/>
+    <p:sldId id="354" r:id="rId105"/>
+    <p:sldId id="355" r:id="rId106"/>
+    <p:sldId id="356" r:id="rId107"/>
+    <p:sldId id="316" r:id="rId108"/>
   </p:sldIdLst>
   <p:sldSz cx="9144000" cy="5143500" type="screen16x9"/>
   <p:notesSz cx="6858000" cy="9144000"/>
@@ -301,7 +303,7 @@
           <a:p>
             <a:fld id="{DDF2FCE7-7AFA-9242-BECB-A61CE0BE95A1}" type="datetimeFigureOut">
               <a:rPr lang="nl-NL" smtClean="0"/>
-              <a:t>17-4-2018</a:t>
+              <a:t>18-4-2018</a:t>
             </a:fld>
             <a:endParaRPr lang="nl-NL"/>
           </a:p>
@@ -2488,6 +2490,174 @@
     <p:extLst>
       <p:ext uri="{BB962C8B-B14F-4D97-AF65-F5344CB8AC3E}">
         <p14:creationId xmlns:p14="http://schemas.microsoft.com/office/powerpoint/2010/main" val="1803308207"/>
+      </p:ext>
+    </p:extLst>
+  </p:cSld>
+  <p:clrMapOvr>
+    <a:masterClrMapping/>
+  </p:clrMapOvr>
+</p:notes>
+</file>
+
+<file path=ppt/notesSlides/notesSlide21.xml><?xml version="1.0" encoding="utf-8"?>
+<p:notes xmlns:a="http://schemas.openxmlformats.org/drawingml/2006/main" xmlns:r="http://schemas.openxmlformats.org/officeDocument/2006/relationships" xmlns:p="http://schemas.openxmlformats.org/presentationml/2006/main">
+  <p:cSld>
+    <p:spTree>
+      <p:nvGrpSpPr>
+        <p:cNvPr id="1" name=""/>
+        <p:cNvGrpSpPr/>
+        <p:nvPr/>
+      </p:nvGrpSpPr>
+      <p:grpSpPr>
+        <a:xfrm>
+          <a:off x="0" y="0"/>
+          <a:ext cx="0" cy="0"/>
+          <a:chOff x="0" y="0"/>
+          <a:chExt cx="0" cy="0"/>
+        </a:xfrm>
+      </p:grpSpPr>
+      <p:sp>
+        <p:nvSpPr>
+          <p:cNvPr id="2" name="Slide Image Placeholder 1"/>
+          <p:cNvSpPr>
+            <a:spLocks noGrp="1" noRot="1" noChangeAspect="1"/>
+          </p:cNvSpPr>
+          <p:nvPr>
+            <p:ph type="sldImg"/>
+          </p:nvPr>
+        </p:nvSpPr>
+        <p:spPr/>
+      </p:sp>
+      <p:sp>
+        <p:nvSpPr>
+          <p:cNvPr id="3" name="Notes Placeholder 2"/>
+          <p:cNvSpPr>
+            <a:spLocks noGrp="1"/>
+          </p:cNvSpPr>
+          <p:nvPr>
+            <p:ph type="body" idx="1"/>
+          </p:nvPr>
+        </p:nvSpPr>
+        <p:spPr/>
+        <p:txBody>
+          <a:bodyPr/>
+          <a:lstStyle/>
+          <a:p>
+            <a:endParaRPr lang="nl-NL"/>
+          </a:p>
+        </p:txBody>
+      </p:sp>
+      <p:sp>
+        <p:nvSpPr>
+          <p:cNvPr id="4" name="Slide Number Placeholder 3"/>
+          <p:cNvSpPr>
+            <a:spLocks noGrp="1"/>
+          </p:cNvSpPr>
+          <p:nvPr>
+            <p:ph type="sldNum" sz="quarter" idx="10"/>
+          </p:nvPr>
+        </p:nvSpPr>
+        <p:spPr/>
+        <p:txBody>
+          <a:bodyPr/>
+          <a:lstStyle/>
+          <a:p>
+            <a:fld id="{CDFB967C-E8DF-AF4B-9B57-A68D256EEC90}" type="slidenum">
+              <a:rPr lang="nl-NL" smtClean="0"/>
+              <a:t>85</a:t>
+            </a:fld>
+            <a:endParaRPr lang="nl-NL"/>
+          </a:p>
+        </p:txBody>
+      </p:sp>
+    </p:spTree>
+    <p:extLst>
+      <p:ext uri="{BB962C8B-B14F-4D97-AF65-F5344CB8AC3E}">
+        <p14:creationId xmlns:p14="http://schemas.microsoft.com/office/powerpoint/2010/main" val="3087707572"/>
+      </p:ext>
+    </p:extLst>
+  </p:cSld>
+  <p:clrMapOvr>
+    <a:masterClrMapping/>
+  </p:clrMapOvr>
+</p:notes>
+</file>
+
+<file path=ppt/notesSlides/notesSlide22.xml><?xml version="1.0" encoding="utf-8"?>
+<p:notes xmlns:a="http://schemas.openxmlformats.org/drawingml/2006/main" xmlns:r="http://schemas.openxmlformats.org/officeDocument/2006/relationships" xmlns:p="http://schemas.openxmlformats.org/presentationml/2006/main">
+  <p:cSld>
+    <p:spTree>
+      <p:nvGrpSpPr>
+        <p:cNvPr id="1" name=""/>
+        <p:cNvGrpSpPr/>
+        <p:nvPr/>
+      </p:nvGrpSpPr>
+      <p:grpSpPr>
+        <a:xfrm>
+          <a:off x="0" y="0"/>
+          <a:ext cx="0" cy="0"/>
+          <a:chOff x="0" y="0"/>
+          <a:chExt cx="0" cy="0"/>
+        </a:xfrm>
+      </p:grpSpPr>
+      <p:sp>
+        <p:nvSpPr>
+          <p:cNvPr id="2" name="Slide Image Placeholder 1"/>
+          <p:cNvSpPr>
+            <a:spLocks noGrp="1" noRot="1" noChangeAspect="1"/>
+          </p:cNvSpPr>
+          <p:nvPr>
+            <p:ph type="sldImg"/>
+          </p:nvPr>
+        </p:nvSpPr>
+        <p:spPr/>
+      </p:sp>
+      <p:sp>
+        <p:nvSpPr>
+          <p:cNvPr id="3" name="Notes Placeholder 2"/>
+          <p:cNvSpPr>
+            <a:spLocks noGrp="1"/>
+          </p:cNvSpPr>
+          <p:nvPr>
+            <p:ph type="body" idx="1"/>
+          </p:nvPr>
+        </p:nvSpPr>
+        <p:spPr/>
+        <p:txBody>
+          <a:bodyPr/>
+          <a:lstStyle/>
+          <a:p>
+            <a:endParaRPr lang="nl-NL"/>
+          </a:p>
+        </p:txBody>
+      </p:sp>
+      <p:sp>
+        <p:nvSpPr>
+          <p:cNvPr id="4" name="Slide Number Placeholder 3"/>
+          <p:cNvSpPr>
+            <a:spLocks noGrp="1"/>
+          </p:cNvSpPr>
+          <p:nvPr>
+            <p:ph type="sldNum" sz="quarter" idx="10"/>
+          </p:nvPr>
+        </p:nvSpPr>
+        <p:spPr/>
+        <p:txBody>
+          <a:bodyPr/>
+          <a:lstStyle/>
+          <a:p>
+            <a:fld id="{CDFB967C-E8DF-AF4B-9B57-A68D256EEC90}" type="slidenum">
+              <a:rPr lang="nl-NL" smtClean="0"/>
+              <a:t>91</a:t>
+            </a:fld>
+            <a:endParaRPr lang="nl-NL"/>
+          </a:p>
+        </p:txBody>
+      </p:sp>
+    </p:spTree>
+    <p:extLst>
+      <p:ext uri="{BB962C8B-B14F-4D97-AF65-F5344CB8AC3E}">
+        <p14:creationId xmlns:p14="http://schemas.microsoft.com/office/powerpoint/2010/main" val="3793457537"/>
       </p:ext>
     </p:extLst>
   </p:cSld>
@@ -8526,48 +8696,181 @@
           <a:bodyPr/>
           <a:lstStyle/>
           <a:p>
-            <a:pPr algn="ctr"/>
-            <a:r>
-              <a:rPr lang="nl-NL" dirty="0"/>
-              <a:t/>
-            </a:r>
-            <a:br>
-              <a:rPr lang="nl-NL" dirty="0"/>
-            </a:br>
-            <a:r>
-              <a:rPr lang="nl-NL" dirty="0" err="1" smtClean="0"/>
-              <a:t>Recap</a:t>
+            <a:r>
+              <a:rPr lang="nl-NL" smtClean="0"/>
+              <a:t>Example</a:t>
+            </a:r>
+            <a:endParaRPr lang="nl-NL"/>
+          </a:p>
+        </p:txBody>
+      </p:sp>
+      <p:sp>
+        <p:nvSpPr>
+          <p:cNvPr id="3" name="Content Placeholder 2"/>
+          <p:cNvSpPr>
+            <a:spLocks noGrp="1"/>
+          </p:cNvSpPr>
+          <p:nvPr>
+            <p:ph idx="1"/>
+          </p:nvPr>
+        </p:nvSpPr>
+        <p:spPr/>
+        <p:txBody>
+          <a:bodyPr/>
+          <a:lstStyle/>
+          <a:p>
+            <a:endParaRPr lang="en-US" smtClean="0"/>
+          </a:p>
+          <a:p>
+            <a:endParaRPr lang="en-US"/>
+          </a:p>
+          <a:p>
+            <a:endParaRPr lang="en-US" smtClean="0"/>
+          </a:p>
+          <a:p>
+            <a:endParaRPr lang="en-US"/>
+          </a:p>
+          <a:p>
+            <a:endParaRPr lang="en-US" smtClean="0"/>
+          </a:p>
+          <a:p>
+            <a:endParaRPr lang="en-US"/>
+          </a:p>
+          <a:p>
+            <a:endParaRPr lang="en-US" smtClean="0"/>
+          </a:p>
+          <a:p>
+            <a:endParaRPr lang="en-US"/>
+          </a:p>
+          <a:p>
+            <a:endParaRPr lang="en-US" smtClean="0"/>
+          </a:p>
+          <a:p>
+            <a:endParaRPr lang="en-US"/>
+          </a:p>
+          <a:p>
+            <a:endParaRPr lang="en-US" smtClean="0"/>
+          </a:p>
+          <a:p>
+            <a:r>
+              <a:rPr lang="en-US" smtClean="0"/>
+              <a:t>Camel-case </a:t>
+            </a:r>
+            <a:r>
+              <a:rPr lang="en-US"/>
+              <a:t>property names are converted into case-insensitive HTML element attributes with hyphens at the camel-case break point of the original name. </a:t>
+            </a:r>
+            <a:endParaRPr lang="nl-NL"/>
+          </a:p>
+          <a:p>
+            <a:endParaRPr lang="nl-NL"/>
+          </a:p>
+        </p:txBody>
+      </p:sp>
+      <p:sp>
+        <p:nvSpPr>
+          <p:cNvPr id="4" name="Footer Placeholder 3"/>
+          <p:cNvSpPr>
+            <a:spLocks noGrp="1"/>
+          </p:cNvSpPr>
+          <p:nvPr>
+            <p:ph type="ftr" sz="quarter" idx="11"/>
+          </p:nvPr>
+        </p:nvSpPr>
+        <p:spPr/>
+        <p:txBody>
+          <a:bodyPr/>
+          <a:lstStyle/>
+          <a:p>
+            <a:r>
+              <a:rPr lang="fr-FR" smtClean="0"/>
+              <a:t>Oracle JET Talent Launch 2018</a:t>
             </a:r>
             <a:endParaRPr lang="nl-NL" dirty="0"/>
           </a:p>
         </p:txBody>
       </p:sp>
-      <p:sp>
-        <p:nvSpPr>
-          <p:cNvPr id="3" name="Footer Placeholder 2"/>
-          <p:cNvSpPr>
-            <a:spLocks noGrp="1"/>
-          </p:cNvSpPr>
-          <p:nvPr>
-            <p:ph type="ftr" sz="quarter" idx="11"/>
-          </p:nvPr>
-        </p:nvSpPr>
-        <p:spPr/>
-        <p:txBody>
-          <a:bodyPr/>
-          <a:lstStyle/>
-          <a:p>
-            <a:r>
-              <a:rPr lang="fr-FR" noProof="0" smtClean="0"/>
-              <a:t>Oracle JET Talent Launch 2018</a:t>
-            </a:r>
-            <a:endParaRPr lang="nl-NL" noProof="0" dirty="0"/>
-          </a:p>
-        </p:txBody>
-      </p:sp>
-      <p:sp>
-        <p:nvSpPr>
-          <p:cNvPr id="5" name="Slide Number Placeholder 4"/>
+      <p:pic>
+        <p:nvPicPr>
+          <p:cNvPr id="6" name="Picture 5"/>
+          <p:cNvPicPr>
+            <a:picLocks noChangeAspect="1"/>
+          </p:cNvPicPr>
+          <p:nvPr/>
+        </p:nvPicPr>
+        <p:blipFill>
+          <a:blip r:embed="rId2"/>
+          <a:stretch>
+            <a:fillRect/>
+          </a:stretch>
+        </p:blipFill>
+        <p:spPr>
+          <a:xfrm>
+            <a:off x="483544" y="732800"/>
+            <a:ext cx="4100410" cy="1932130"/>
+          </a:xfrm>
+          <a:prstGeom prst="rect">
+            <a:avLst/>
+          </a:prstGeom>
+        </p:spPr>
+      </p:pic>
+      <p:pic>
+        <p:nvPicPr>
+          <p:cNvPr id="8" name="Picture 7"/>
+          <p:cNvPicPr>
+            <a:picLocks noChangeAspect="1"/>
+          </p:cNvPicPr>
+          <p:nvPr/>
+        </p:nvPicPr>
+        <p:blipFill>
+          <a:blip r:embed="rId3"/>
+          <a:stretch>
+            <a:fillRect/>
+          </a:stretch>
+        </p:blipFill>
+        <p:spPr>
+          <a:xfrm>
+            <a:off x="4968000" y="2009553"/>
+            <a:ext cx="3002540" cy="1310754"/>
+          </a:xfrm>
+          <a:prstGeom prst="rect">
+            <a:avLst/>
+          </a:prstGeom>
+          <a:solidFill>
+            <a:srgbClr val="FFFFFF">
+              <a:shade val="85000"/>
+            </a:srgbClr>
+          </a:solidFill>
+          <a:ln w="88900" cap="sq">
+            <a:solidFill>
+              <a:srgbClr val="FFFFFF"/>
+            </a:solidFill>
+            <a:miter lim="800000"/>
+          </a:ln>
+          <a:effectLst>
+            <a:outerShdw blurRad="55000" dist="18000" dir="5400000" algn="tl" rotWithShape="0">
+              <a:srgbClr val="000000">
+                <a:alpha val="40000"/>
+              </a:srgbClr>
+            </a:outerShdw>
+          </a:effectLst>
+          <a:scene3d>
+            <a:camera prst="orthographicFront"/>
+            <a:lightRig rig="twoPt" dir="t">
+              <a:rot lat="0" lon="0" rev="7200000"/>
+            </a:lightRig>
+          </a:scene3d>
+          <a:sp3d>
+            <a:bevelT w="25400" h="19050"/>
+            <a:contourClr>
+              <a:srgbClr val="FFFFFF"/>
+            </a:contourClr>
+          </a:sp3d>
+        </p:spPr>
+      </p:pic>
+      <p:sp>
+        <p:nvSpPr>
+          <p:cNvPr id="7" name="Slide Number Placeholder 6"/>
           <p:cNvSpPr>
             <a:spLocks noGrp="1"/>
           </p:cNvSpPr>
@@ -8581,17 +8884,17 @@
           <a:lstStyle/>
           <a:p>
             <a:fld id="{14F1411D-0280-154F-AEAC-4C20B7AA46B2}" type="slidenum">
-              <a:rPr lang="nl-NL" noProof="0" smtClean="0"/>
+              <a:rPr lang="nl-NL" smtClean="0"/>
               <a:t>100</a:t>
             </a:fld>
-            <a:endParaRPr lang="nl-NL" noProof="0" dirty="0"/>
+            <a:endParaRPr lang="nl-NL"/>
           </a:p>
         </p:txBody>
       </p:sp>
     </p:spTree>
     <p:extLst>
       <p:ext uri="{BB962C8B-B14F-4D97-AF65-F5344CB8AC3E}">
-        <p14:creationId xmlns:p14="http://schemas.microsoft.com/office/powerpoint/2010/main" val="685363294"/>
+        <p14:creationId xmlns:p14="http://schemas.microsoft.com/office/powerpoint/2010/main" val="189595874"/>
       </p:ext>
     </p:extLst>
   </p:cSld>
@@ -8620,6 +8923,153 @@
       </p:grpSpPr>
       <p:sp>
         <p:nvSpPr>
+          <p:cNvPr id="2" name="Titel 1"/>
+          <p:cNvSpPr>
+            <a:spLocks noGrp="1"/>
+          </p:cNvSpPr>
+          <p:nvPr>
+            <p:ph type="title"/>
+          </p:nvPr>
+        </p:nvSpPr>
+        <p:spPr/>
+        <p:txBody>
+          <a:bodyPr/>
+          <a:lstStyle/>
+          <a:p>
+            <a:pPr algn="ctr"/>
+            <a:r>
+              <a:rPr lang="nl-NL" smtClean="0"/>
+              <a:t>Assignment - Composite </a:t>
+            </a:r>
+            <a:r>
+              <a:rPr lang="nl-NL" dirty="0" smtClean="0"/>
+              <a:t>Component</a:t>
+            </a:r>
+            <a:endParaRPr lang="nl-NL" dirty="0"/>
+          </a:p>
+        </p:txBody>
+      </p:sp>
+      <p:sp>
+        <p:nvSpPr>
+          <p:cNvPr id="3" name="Tijdelijke aanduiding voor inhoud 2"/>
+          <p:cNvSpPr>
+            <a:spLocks noGrp="1"/>
+          </p:cNvSpPr>
+          <p:nvPr>
+            <p:ph idx="1"/>
+          </p:nvPr>
+        </p:nvSpPr>
+        <p:spPr/>
+        <p:txBody>
+          <a:bodyPr/>
+          <a:lstStyle/>
+          <a:p>
+            <a:r>
+              <a:rPr lang="nl-NL"/>
+              <a:t>Simple component for use in VBCS </a:t>
+            </a:r>
+            <a:r>
+              <a:rPr lang="nl-NL" smtClean="0"/>
+              <a:t>training</a:t>
+            </a:r>
+          </a:p>
+          <a:p>
+            <a:endParaRPr lang="nl-NL"/>
+          </a:p>
+          <a:p>
+            <a:r>
+              <a:rPr lang="nl-NL"/>
+              <a:t>Expand on this with extra </a:t>
+            </a:r>
+            <a:r>
+              <a:rPr lang="nl-NL" smtClean="0"/>
+              <a:t>assignments</a:t>
+            </a:r>
+            <a:endParaRPr lang="nl-NL"/>
+          </a:p>
+          <a:p>
+            <a:endParaRPr lang="nl-NL" dirty="0"/>
+          </a:p>
+        </p:txBody>
+      </p:sp>
+      <p:sp>
+        <p:nvSpPr>
+          <p:cNvPr id="4" name="Tijdelijke aanduiding voor voettekst 3"/>
+          <p:cNvSpPr>
+            <a:spLocks noGrp="1"/>
+          </p:cNvSpPr>
+          <p:nvPr>
+            <p:ph type="ftr" sz="quarter" idx="11"/>
+          </p:nvPr>
+        </p:nvSpPr>
+        <p:spPr/>
+        <p:txBody>
+          <a:bodyPr/>
+          <a:lstStyle/>
+          <a:p>
+            <a:r>
+              <a:rPr lang="fr-FR" smtClean="0"/>
+              <a:t>Oracle JET Talent Launch 2018</a:t>
+            </a:r>
+            <a:endParaRPr lang="nl-NL"/>
+          </a:p>
+        </p:txBody>
+      </p:sp>
+      <p:sp>
+        <p:nvSpPr>
+          <p:cNvPr id="6" name="Slide Number Placeholder 5"/>
+          <p:cNvSpPr>
+            <a:spLocks noGrp="1"/>
+          </p:cNvSpPr>
+          <p:nvPr>
+            <p:ph type="sldNum" sz="quarter" idx="12"/>
+          </p:nvPr>
+        </p:nvSpPr>
+        <p:spPr/>
+        <p:txBody>
+          <a:bodyPr/>
+          <a:lstStyle/>
+          <a:p>
+            <a:fld id="{14F1411D-0280-154F-AEAC-4C20B7AA46B2}" type="slidenum">
+              <a:rPr lang="nl-NL" smtClean="0"/>
+              <a:t>101</a:t>
+            </a:fld>
+            <a:endParaRPr lang="nl-NL"/>
+          </a:p>
+        </p:txBody>
+      </p:sp>
+    </p:spTree>
+    <p:extLst>
+      <p:ext uri="{BB962C8B-B14F-4D97-AF65-F5344CB8AC3E}">
+        <p14:creationId xmlns:p14="http://schemas.microsoft.com/office/powerpoint/2010/main" val="1664126380"/>
+      </p:ext>
+    </p:extLst>
+  </p:cSld>
+  <p:clrMapOvr>
+    <a:masterClrMapping/>
+  </p:clrMapOvr>
+</p:sld>
+</file>
+
+<file path=ppt/slides/slide102.xml><?xml version="1.0" encoding="utf-8"?>
+<p:sld xmlns:a="http://schemas.openxmlformats.org/drawingml/2006/main" xmlns:r="http://schemas.openxmlformats.org/officeDocument/2006/relationships" xmlns:p="http://schemas.openxmlformats.org/presentationml/2006/main">
+  <p:cSld>
+    <p:spTree>
+      <p:nvGrpSpPr>
+        <p:cNvPr id="1" name=""/>
+        <p:cNvGrpSpPr/>
+        <p:nvPr/>
+      </p:nvGrpSpPr>
+      <p:grpSpPr>
+        <a:xfrm>
+          <a:off x="0" y="0"/>
+          <a:ext cx="0" cy="0"/>
+          <a:chOff x="0" y="0"/>
+          <a:chExt cx="0" cy="0"/>
+        </a:xfrm>
+      </p:grpSpPr>
+      <p:sp>
+        <p:nvSpPr>
           <p:cNvPr id="2" name="Title 1"/>
           <p:cNvSpPr>
             <a:spLocks noGrp="1"/>
@@ -8633,6 +9083,113 @@
           <a:bodyPr/>
           <a:lstStyle/>
           <a:p>
+            <a:pPr algn="ctr"/>
+            <a:r>
+              <a:rPr lang="nl-NL" dirty="0"/>
+              <a:t/>
+            </a:r>
+            <a:br>
+              <a:rPr lang="nl-NL" dirty="0"/>
+            </a:br>
+            <a:r>
+              <a:rPr lang="nl-NL" dirty="0" err="1" smtClean="0"/>
+              <a:t>Recap</a:t>
+            </a:r>
+            <a:endParaRPr lang="nl-NL" dirty="0"/>
+          </a:p>
+        </p:txBody>
+      </p:sp>
+      <p:sp>
+        <p:nvSpPr>
+          <p:cNvPr id="3" name="Footer Placeholder 2"/>
+          <p:cNvSpPr>
+            <a:spLocks noGrp="1"/>
+          </p:cNvSpPr>
+          <p:nvPr>
+            <p:ph type="ftr" sz="quarter" idx="11"/>
+          </p:nvPr>
+        </p:nvSpPr>
+        <p:spPr/>
+        <p:txBody>
+          <a:bodyPr/>
+          <a:lstStyle/>
+          <a:p>
+            <a:r>
+              <a:rPr lang="fr-FR" noProof="0" smtClean="0"/>
+              <a:t>Oracle JET Talent Launch 2018</a:t>
+            </a:r>
+            <a:endParaRPr lang="nl-NL" noProof="0" dirty="0"/>
+          </a:p>
+        </p:txBody>
+      </p:sp>
+      <p:sp>
+        <p:nvSpPr>
+          <p:cNvPr id="5" name="Slide Number Placeholder 4"/>
+          <p:cNvSpPr>
+            <a:spLocks noGrp="1"/>
+          </p:cNvSpPr>
+          <p:nvPr>
+            <p:ph type="sldNum" sz="quarter" idx="12"/>
+          </p:nvPr>
+        </p:nvSpPr>
+        <p:spPr/>
+        <p:txBody>
+          <a:bodyPr/>
+          <a:lstStyle/>
+          <a:p>
+            <a:fld id="{14F1411D-0280-154F-AEAC-4C20B7AA46B2}" type="slidenum">
+              <a:rPr lang="nl-NL" noProof="0" smtClean="0"/>
+              <a:t>102</a:t>
+            </a:fld>
+            <a:endParaRPr lang="nl-NL" noProof="0" dirty="0"/>
+          </a:p>
+        </p:txBody>
+      </p:sp>
+    </p:spTree>
+    <p:extLst>
+      <p:ext uri="{BB962C8B-B14F-4D97-AF65-F5344CB8AC3E}">
+        <p14:creationId xmlns:p14="http://schemas.microsoft.com/office/powerpoint/2010/main" val="685363294"/>
+      </p:ext>
+    </p:extLst>
+  </p:cSld>
+  <p:clrMapOvr>
+    <a:masterClrMapping/>
+  </p:clrMapOvr>
+</p:sld>
+</file>
+
+<file path=ppt/slides/slide103.xml><?xml version="1.0" encoding="utf-8"?>
+<p:sld xmlns:a="http://schemas.openxmlformats.org/drawingml/2006/main" xmlns:r="http://schemas.openxmlformats.org/officeDocument/2006/relationships" xmlns:p="http://schemas.openxmlformats.org/presentationml/2006/main">
+  <p:cSld>
+    <p:spTree>
+      <p:nvGrpSpPr>
+        <p:cNvPr id="1" name=""/>
+        <p:cNvGrpSpPr/>
+        <p:nvPr/>
+      </p:nvGrpSpPr>
+      <p:grpSpPr>
+        <a:xfrm>
+          <a:off x="0" y="0"/>
+          <a:ext cx="0" cy="0"/>
+          <a:chOff x="0" y="0"/>
+          <a:chExt cx="0" cy="0"/>
+        </a:xfrm>
+      </p:grpSpPr>
+      <p:sp>
+        <p:nvSpPr>
+          <p:cNvPr id="2" name="Title 1"/>
+          <p:cNvSpPr>
+            <a:spLocks noGrp="1"/>
+          </p:cNvSpPr>
+          <p:nvPr>
+            <p:ph type="title"/>
+          </p:nvPr>
+        </p:nvSpPr>
+        <p:spPr/>
+        <p:txBody>
+          <a:bodyPr/>
+          <a:lstStyle/>
+          <a:p>
             <a:r>
               <a:rPr lang="nl-NL" smtClean="0"/>
               <a:t>Wrap-up</a:t>
@@ -8658,11 +9215,7 @@
           <a:p>
             <a:r>
               <a:rPr lang="nl-NL" smtClean="0"/>
-              <a:t>Thank you</a:t>
-            </a:r>
-            <a:r>
-              <a:rPr lang="nl-NL" smtClean="0"/>
-              <a:t>!</a:t>
+              <a:t>Thank you!</a:t>
             </a:r>
           </a:p>
           <a:p>
@@ -8673,18 +9226,12 @@
               <a:rPr lang="nl-NL" smtClean="0"/>
               <a:t>What have we done?</a:t>
             </a:r>
-            <a:endParaRPr lang="nl-NL" smtClean="0"/>
-          </a:p>
-          <a:p>
-            <a:r>
-              <a:rPr lang="nl-NL" smtClean="0"/>
-              <a:t>Oracle JET </a:t>
-            </a:r>
-            <a:r>
-              <a:rPr lang="nl-NL" smtClean="0"/>
-              <a:t>and the UI Practice</a:t>
-            </a:r>
-            <a:endParaRPr lang="nl-NL" smtClean="0"/>
+          </a:p>
+          <a:p>
+            <a:r>
+              <a:rPr lang="nl-NL" smtClean="0"/>
+              <a:t>Oracle JET and the UI Practice</a:t>
+            </a:r>
           </a:p>
           <a:p>
             <a:pPr marL="180000" lvl="1" indent="0">
@@ -8734,7 +9281,7 @@
           <a:p>
             <a:fld id="{14F1411D-0280-154F-AEAC-4C20B7AA46B2}" type="slidenum">
               <a:rPr lang="nl-NL" smtClean="0"/>
-              <a:t>101</a:t>
+              <a:t>103</a:t>
             </a:fld>
             <a:endParaRPr lang="nl-NL"/>
           </a:p>
@@ -8849,326 +9396,6 @@
 </p:sld>
 </file>
 
-<file path=ppt/slides/slide102.xml><?xml version="1.0" encoding="utf-8"?>
-<p:sld xmlns:a="http://schemas.openxmlformats.org/drawingml/2006/main" xmlns:r="http://schemas.openxmlformats.org/officeDocument/2006/relationships" xmlns:p="http://schemas.openxmlformats.org/presentationml/2006/main">
-  <p:cSld>
-    <p:spTree>
-      <p:nvGrpSpPr>
-        <p:cNvPr id="1" name=""/>
-        <p:cNvGrpSpPr/>
-        <p:nvPr/>
-      </p:nvGrpSpPr>
-      <p:grpSpPr>
-        <a:xfrm>
-          <a:off x="0" y="0"/>
-          <a:ext cx="0" cy="0"/>
-          <a:chOff x="0" y="0"/>
-          <a:chExt cx="0" cy="0"/>
-        </a:xfrm>
-      </p:grpSpPr>
-      <p:sp>
-        <p:nvSpPr>
-          <p:cNvPr id="2" name="Title 1"/>
-          <p:cNvSpPr>
-            <a:spLocks noGrp="1"/>
-          </p:cNvSpPr>
-          <p:nvPr>
-            <p:ph type="title"/>
-          </p:nvPr>
-        </p:nvSpPr>
-        <p:spPr/>
-        <p:txBody>
-          <a:bodyPr/>
-          <a:lstStyle/>
-          <a:p>
-            <a:r>
-              <a:rPr lang="nl-NL" smtClean="0"/>
-              <a:t>Sources and further reading</a:t>
-            </a:r>
-            <a:endParaRPr lang="nl-NL"/>
-          </a:p>
-        </p:txBody>
-      </p:sp>
-      <p:sp>
-        <p:nvSpPr>
-          <p:cNvPr id="3" name="Content Placeholder 2"/>
-          <p:cNvSpPr>
-            <a:spLocks noGrp="1"/>
-          </p:cNvSpPr>
-          <p:nvPr>
-            <p:ph idx="1"/>
-          </p:nvPr>
-        </p:nvSpPr>
-        <p:spPr/>
-        <p:txBody>
-          <a:bodyPr/>
-          <a:lstStyle/>
-          <a:p>
-            <a:pPr lvl="1"/>
-            <a:r>
-              <a:rPr lang="nl-NL" smtClean="0">
-                <a:hlinkClick r:id="rId2"/>
-              </a:rPr>
-              <a:t>http</a:t>
-            </a:r>
-            <a:r>
-              <a:rPr lang="nl-NL">
-                <a:hlinkClick r:id="rId2"/>
-              </a:rPr>
-              <a:t>://</a:t>
-            </a:r>
-            <a:r>
-              <a:rPr lang="nl-NL" smtClean="0">
-                <a:hlinkClick r:id="rId2"/>
-              </a:rPr>
-              <a:t>www.oracle.com</a:t>
-            </a:r>
-            <a:endParaRPr lang="nl-NL" smtClean="0"/>
-          </a:p>
-          <a:p>
-            <a:pPr lvl="1"/>
-            <a:r>
-              <a:rPr lang="nl-NL">
-                <a:hlinkClick r:id="rId3"/>
-              </a:rPr>
-              <a:t>http://</a:t>
-            </a:r>
-            <a:r>
-              <a:rPr lang="nl-NL" smtClean="0">
-                <a:hlinkClick r:id="rId3"/>
-              </a:rPr>
-              <a:t>knockoutjs.com</a:t>
-            </a:r>
-            <a:endParaRPr lang="nl-NL" smtClean="0"/>
-          </a:p>
-          <a:p>
-            <a:pPr lvl="1"/>
-            <a:r>
-              <a:rPr lang="nl-NL">
-                <a:hlinkClick r:id="rId4"/>
-              </a:rPr>
-              <a:t>https://</a:t>
-            </a:r>
-            <a:r>
-              <a:rPr lang="nl-NL" smtClean="0">
-                <a:hlinkClick r:id="rId4"/>
-              </a:rPr>
-              <a:t>github.com/nklasens/amis-course-2018.git</a:t>
-            </a:r>
-            <a:r>
-              <a:rPr lang="nl-NL" smtClean="0"/>
-              <a:t> (Nico Klasens, Lucas Jellema)</a:t>
-            </a:r>
-          </a:p>
-          <a:p>
-            <a:pPr lvl="1"/>
-            <a:r>
-              <a:rPr lang="nl-NL" smtClean="0"/>
-              <a:t>Duncan Mills </a:t>
-            </a:r>
-            <a:r>
-              <a:rPr lang="nl-NL"/>
-              <a:t>blogs: https://blogs.oracle.com/groundside/cca</a:t>
-            </a:r>
-            <a:endParaRPr lang="nl-NL" smtClean="0"/>
-          </a:p>
-          <a:p>
-            <a:pPr lvl="1"/>
-            <a:endParaRPr lang="nl-NL" smtClean="0"/>
-          </a:p>
-          <a:p>
-            <a:pPr lvl="1"/>
-            <a:endParaRPr lang="nl-NL"/>
-          </a:p>
-        </p:txBody>
-      </p:sp>
-      <p:sp>
-        <p:nvSpPr>
-          <p:cNvPr id="4" name="Footer Placeholder 3"/>
-          <p:cNvSpPr>
-            <a:spLocks noGrp="1"/>
-          </p:cNvSpPr>
-          <p:nvPr>
-            <p:ph type="ftr" sz="quarter" idx="11"/>
-          </p:nvPr>
-        </p:nvSpPr>
-        <p:spPr/>
-        <p:txBody>
-          <a:bodyPr/>
-          <a:lstStyle/>
-          <a:p>
-            <a:r>
-              <a:rPr lang="fr-FR" smtClean="0"/>
-              <a:t>Oracle JET Talent Launch 2018</a:t>
-            </a:r>
-            <a:endParaRPr lang="nl-NL" dirty="0"/>
-          </a:p>
-        </p:txBody>
-      </p:sp>
-      <p:sp>
-        <p:nvSpPr>
-          <p:cNvPr id="6" name="Slide Number Placeholder 5"/>
-          <p:cNvSpPr>
-            <a:spLocks noGrp="1"/>
-          </p:cNvSpPr>
-          <p:nvPr>
-            <p:ph type="sldNum" sz="quarter" idx="12"/>
-          </p:nvPr>
-        </p:nvSpPr>
-        <p:spPr/>
-        <p:txBody>
-          <a:bodyPr/>
-          <a:lstStyle/>
-          <a:p>
-            <a:fld id="{14F1411D-0280-154F-AEAC-4C20B7AA46B2}" type="slidenum">
-              <a:rPr lang="nl-NL" smtClean="0"/>
-              <a:t>102</a:t>
-            </a:fld>
-            <a:endParaRPr lang="nl-NL"/>
-          </a:p>
-        </p:txBody>
-      </p:sp>
-    </p:spTree>
-    <p:extLst>
-      <p:ext uri="{BB962C8B-B14F-4D97-AF65-F5344CB8AC3E}">
-        <p14:creationId xmlns:p14="http://schemas.microsoft.com/office/powerpoint/2010/main" val="1961581600"/>
-      </p:ext>
-    </p:extLst>
-  </p:cSld>
-  <p:clrMapOvr>
-    <a:masterClrMapping/>
-  </p:clrMapOvr>
-</p:sld>
-</file>
-
-<file path=ppt/slides/slide103.xml><?xml version="1.0" encoding="utf-8"?>
-<p:sld xmlns:a="http://schemas.openxmlformats.org/drawingml/2006/main" xmlns:r="http://schemas.openxmlformats.org/officeDocument/2006/relationships" xmlns:p="http://schemas.openxmlformats.org/presentationml/2006/main">
-  <p:cSld>
-    <p:spTree>
-      <p:nvGrpSpPr>
-        <p:cNvPr id="1" name=""/>
-        <p:cNvGrpSpPr/>
-        <p:nvPr/>
-      </p:nvGrpSpPr>
-      <p:grpSpPr>
-        <a:xfrm>
-          <a:off x="0" y="0"/>
-          <a:ext cx="0" cy="0"/>
-          <a:chOff x="0" y="0"/>
-          <a:chExt cx="0" cy="0"/>
-        </a:xfrm>
-      </p:grpSpPr>
-      <p:sp>
-        <p:nvSpPr>
-          <p:cNvPr id="2" name="Title 1"/>
-          <p:cNvSpPr>
-            <a:spLocks noGrp="1"/>
-          </p:cNvSpPr>
-          <p:nvPr>
-            <p:ph type="title"/>
-          </p:nvPr>
-        </p:nvSpPr>
-        <p:spPr/>
-        <p:txBody>
-          <a:bodyPr/>
-          <a:lstStyle/>
-          <a:p>
-            <a:r>
-              <a:rPr lang="nl-NL" smtClean="0"/>
-              <a:t>Feedback</a:t>
-            </a:r>
-            <a:endParaRPr lang="nl-NL"/>
-          </a:p>
-        </p:txBody>
-      </p:sp>
-      <p:pic>
-        <p:nvPicPr>
-          <p:cNvPr id="6" name="Content Placeholder 5"/>
-          <p:cNvPicPr>
-            <a:picLocks noGrp="1" noChangeAspect="1"/>
-          </p:cNvPicPr>
-          <p:nvPr>
-            <p:ph idx="1"/>
-          </p:nvPr>
-        </p:nvPicPr>
-        <p:blipFill>
-          <a:blip r:embed="rId2">
-            <a:extLst>
-              <a:ext uri="{28A0092B-C50C-407E-A947-70E740481C1C}">
-                <a14:useLocalDpi xmlns:a14="http://schemas.microsoft.com/office/drawing/2010/main" val="0"/>
-              </a:ext>
-            </a:extLst>
-          </a:blip>
-          <a:stretch>
-            <a:fillRect/>
-          </a:stretch>
-        </p:blipFill>
-        <p:spPr>
-          <a:xfrm>
-            <a:off x="1794137" y="936625"/>
-            <a:ext cx="4476225" cy="3779838"/>
-          </a:xfrm>
-        </p:spPr>
-      </p:pic>
-      <p:sp>
-        <p:nvSpPr>
-          <p:cNvPr id="4" name="Footer Placeholder 3"/>
-          <p:cNvSpPr>
-            <a:spLocks noGrp="1"/>
-          </p:cNvSpPr>
-          <p:nvPr>
-            <p:ph type="ftr" sz="quarter" idx="11"/>
-          </p:nvPr>
-        </p:nvSpPr>
-        <p:spPr/>
-        <p:txBody>
-          <a:bodyPr/>
-          <a:lstStyle/>
-          <a:p>
-            <a:r>
-              <a:rPr lang="fr-FR" smtClean="0"/>
-              <a:t>Oracle JET Talent Launch 2018</a:t>
-            </a:r>
-            <a:endParaRPr lang="nl-NL" dirty="0"/>
-          </a:p>
-        </p:txBody>
-      </p:sp>
-      <p:sp>
-        <p:nvSpPr>
-          <p:cNvPr id="3" name="Slide Number Placeholder 2"/>
-          <p:cNvSpPr>
-            <a:spLocks noGrp="1"/>
-          </p:cNvSpPr>
-          <p:nvPr>
-            <p:ph type="sldNum" sz="quarter" idx="12"/>
-          </p:nvPr>
-        </p:nvSpPr>
-        <p:spPr/>
-        <p:txBody>
-          <a:bodyPr/>
-          <a:lstStyle/>
-          <a:p>
-            <a:fld id="{14F1411D-0280-154F-AEAC-4C20B7AA46B2}" type="slidenum">
-              <a:rPr lang="nl-NL" smtClean="0"/>
-              <a:t>103</a:t>
-            </a:fld>
-            <a:endParaRPr lang="nl-NL"/>
-          </a:p>
-        </p:txBody>
-      </p:sp>
-    </p:spTree>
-    <p:extLst>
-      <p:ext uri="{BB962C8B-B14F-4D97-AF65-F5344CB8AC3E}">
-        <p14:creationId xmlns:p14="http://schemas.microsoft.com/office/powerpoint/2010/main" val="1797184607"/>
-      </p:ext>
-    </p:extLst>
-  </p:cSld>
-  <p:clrMapOvr>
-    <a:masterClrMapping/>
-  </p:clrMapOvr>
-</p:sld>
-</file>
-
 <file path=ppt/slides/slide104.xml><?xml version="1.0" encoding="utf-8"?>
 <p:sld xmlns:a="http://schemas.openxmlformats.org/drawingml/2006/main" xmlns:r="http://schemas.openxmlformats.org/officeDocument/2006/relationships" xmlns:p="http://schemas.openxmlformats.org/presentationml/2006/main">
   <p:cSld>
@@ -9202,9 +9429,10 @@
           <a:lstStyle/>
           <a:p>
             <a:r>
-              <a:rPr lang="nl-NL"/>
-              <a:t>DIY Extra</a:t>
-            </a:r>
+              <a:rPr lang="nl-NL" smtClean="0"/>
+              <a:t>Sources and further reading</a:t>
+            </a:r>
+            <a:endParaRPr lang="nl-NL"/>
           </a:p>
         </p:txBody>
       </p:sp>
@@ -9223,32 +9451,26 @@
           <a:bodyPr/>
           <a:lstStyle/>
           <a:p>
-            <a:r>
-              <a:rPr lang="nl-NL" smtClean="0"/>
-              <a:t>SIG Lucas Jellema JET and OpenLayers</a:t>
-            </a:r>
-          </a:p>
-          <a:p>
             <a:pPr lvl="1"/>
+            <a:r>
+              <a:rPr lang="nl-NL" smtClean="0">
+                <a:hlinkClick r:id="rId2"/>
+              </a:rPr>
+              <a:t>http</a:t>
+            </a:r>
             <a:r>
               <a:rPr lang="nl-NL">
                 <a:hlinkClick r:id="rId2"/>
               </a:rPr>
-              <a:t>https://</a:t>
+              <a:t>://</a:t>
             </a:r>
             <a:r>
               <a:rPr lang="nl-NL" smtClean="0">
                 <a:hlinkClick r:id="rId2"/>
               </a:rPr>
-              <a:t>github.com/lucasjellema/sig-meetup-jet-openlayers-composite-components.git</a:t>
+              <a:t>www.oracle.com</a:t>
             </a:r>
             <a:endParaRPr lang="nl-NL" smtClean="0"/>
-          </a:p>
-          <a:p>
-            <a:r>
-              <a:rPr lang="nl-NL" smtClean="0"/>
-              <a:t>Other Knockout tutorials</a:t>
-            </a:r>
           </a:p>
           <a:p>
             <a:pPr lvl="1"/>
@@ -9256,15 +9478,15 @@
               <a:rPr lang="nl-NL">
                 <a:hlinkClick r:id="rId3"/>
               </a:rPr>
-              <a:t>http://knockoutjs.com</a:t>
-            </a:r>
-            <a:endParaRPr lang="nl-NL"/>
-          </a:p>
-          <a:p>
-            <a:r>
-              <a:rPr lang="nl-NL" smtClean="0"/>
-              <a:t>jQuery tutorials</a:t>
-            </a:r>
+              <a:t>http://</a:t>
+            </a:r>
+            <a:r>
+              <a:rPr lang="nl-NL" smtClean="0">
+                <a:hlinkClick r:id="rId3"/>
+              </a:rPr>
+              <a:t>knockoutjs.com</a:t>
+            </a:r>
+            <a:endParaRPr lang="nl-NL" smtClean="0"/>
           </a:p>
           <a:p>
             <a:pPr lvl="1"/>
@@ -9278,33 +9500,31 @@
               <a:rPr lang="nl-NL" smtClean="0">
                 <a:hlinkClick r:id="rId4"/>
               </a:rPr>
-              <a:t>www.w3schools.com/jquery/default.asp</a:t>
+              <a:t>github.com/nklasens/amis-course-2018.git</a:t>
+            </a:r>
+            <a:r>
+              <a:rPr lang="nl-NL" smtClean="0"/>
+              <a:t> (Nico Klasens, Lucas Jellema)</a:t>
+            </a:r>
+          </a:p>
+          <a:p>
+            <a:pPr lvl="1"/>
+            <a:r>
+              <a:rPr lang="nl-NL" smtClean="0"/>
+              <a:t>Duncan Mills </a:t>
+            </a:r>
+            <a:r>
+              <a:rPr lang="nl-NL"/>
+              <a:t>blogs: https://blogs.oracle.com/groundside/cca</a:t>
             </a:r>
             <a:endParaRPr lang="nl-NL" smtClean="0"/>
           </a:p>
           <a:p>
             <a:pPr lvl="1"/>
-            <a:r>
-              <a:rPr lang="nl-NL">
-                <a:hlinkClick r:id="rId5"/>
-              </a:rPr>
-              <a:t>http://</a:t>
-            </a:r>
-            <a:r>
-              <a:rPr lang="nl-NL" smtClean="0">
-                <a:hlinkClick r:id="rId5"/>
-              </a:rPr>
-              <a:t>jqfundamentals.com/chapter/jquery-basics</a:t>
-            </a:r>
             <a:endParaRPr lang="nl-NL" smtClean="0"/>
           </a:p>
           <a:p>
-            <a:r>
-              <a:rPr lang="nl-NL" smtClean="0"/>
-              <a:t>JET MOOC</a:t>
-            </a:r>
-          </a:p>
-          <a:p>
+            <a:pPr lvl="1"/>
             <a:endParaRPr lang="nl-NL"/>
           </a:p>
         </p:txBody>
@@ -9358,7 +9578,7 @@
     </p:spTree>
     <p:extLst>
       <p:ext uri="{BB962C8B-B14F-4D97-AF65-F5344CB8AC3E}">
-        <p14:creationId xmlns:p14="http://schemas.microsoft.com/office/powerpoint/2010/main" val="3619804874"/>
+        <p14:creationId xmlns:p14="http://schemas.microsoft.com/office/powerpoint/2010/main" val="1961581600"/>
       </p:ext>
     </p:extLst>
   </p:cSld>
@@ -9387,7 +9607,59 @@
       </p:grpSpPr>
       <p:sp>
         <p:nvSpPr>
-          <p:cNvPr id="2" name="Tijdelijke aanduiding voor voettekst 1"/>
+          <p:cNvPr id="2" name="Title 1"/>
+          <p:cNvSpPr>
+            <a:spLocks noGrp="1"/>
+          </p:cNvSpPr>
+          <p:nvPr>
+            <p:ph type="title"/>
+          </p:nvPr>
+        </p:nvSpPr>
+        <p:spPr/>
+        <p:txBody>
+          <a:bodyPr/>
+          <a:lstStyle/>
+          <a:p>
+            <a:r>
+              <a:rPr lang="nl-NL" smtClean="0"/>
+              <a:t>Feedback</a:t>
+            </a:r>
+            <a:endParaRPr lang="nl-NL"/>
+          </a:p>
+        </p:txBody>
+      </p:sp>
+      <p:pic>
+        <p:nvPicPr>
+          <p:cNvPr id="6" name="Content Placeholder 5"/>
+          <p:cNvPicPr>
+            <a:picLocks noGrp="1" noChangeAspect="1"/>
+          </p:cNvPicPr>
+          <p:nvPr>
+            <p:ph idx="1"/>
+          </p:nvPr>
+        </p:nvPicPr>
+        <p:blipFill>
+          <a:blip r:embed="rId2">
+            <a:extLst>
+              <a:ext uri="{28A0092B-C50C-407E-A947-70E740481C1C}">
+                <a14:useLocalDpi xmlns:a14="http://schemas.microsoft.com/office/drawing/2010/main" val="0"/>
+              </a:ext>
+            </a:extLst>
+          </a:blip>
+          <a:stretch>
+            <a:fillRect/>
+          </a:stretch>
+        </p:blipFill>
+        <p:spPr>
+          <a:xfrm>
+            <a:off x="1794137" y="936625"/>
+            <a:ext cx="4476225" cy="3779838"/>
+          </a:xfrm>
+        </p:spPr>
+      </p:pic>
+      <p:sp>
+        <p:nvSpPr>
+          <p:cNvPr id="4" name="Footer Placeholder 3"/>
           <p:cNvSpPr>
             <a:spLocks noGrp="1"/>
           </p:cNvSpPr>
@@ -9404,6 +9676,281 @@
               <a:rPr lang="fr-FR" smtClean="0"/>
               <a:t>Oracle JET Talent Launch 2018</a:t>
             </a:r>
+            <a:endParaRPr lang="nl-NL" dirty="0"/>
+          </a:p>
+        </p:txBody>
+      </p:sp>
+      <p:sp>
+        <p:nvSpPr>
+          <p:cNvPr id="3" name="Slide Number Placeholder 2"/>
+          <p:cNvSpPr>
+            <a:spLocks noGrp="1"/>
+          </p:cNvSpPr>
+          <p:nvPr>
+            <p:ph type="sldNum" sz="quarter" idx="12"/>
+          </p:nvPr>
+        </p:nvSpPr>
+        <p:spPr/>
+        <p:txBody>
+          <a:bodyPr/>
+          <a:lstStyle/>
+          <a:p>
+            <a:fld id="{14F1411D-0280-154F-AEAC-4C20B7AA46B2}" type="slidenum">
+              <a:rPr lang="nl-NL" smtClean="0"/>
+              <a:t>105</a:t>
+            </a:fld>
+            <a:endParaRPr lang="nl-NL"/>
+          </a:p>
+        </p:txBody>
+      </p:sp>
+    </p:spTree>
+    <p:extLst>
+      <p:ext uri="{BB962C8B-B14F-4D97-AF65-F5344CB8AC3E}">
+        <p14:creationId xmlns:p14="http://schemas.microsoft.com/office/powerpoint/2010/main" val="1797184607"/>
+      </p:ext>
+    </p:extLst>
+  </p:cSld>
+  <p:clrMapOvr>
+    <a:masterClrMapping/>
+  </p:clrMapOvr>
+</p:sld>
+</file>
+
+<file path=ppt/slides/slide106.xml><?xml version="1.0" encoding="utf-8"?>
+<p:sld xmlns:a="http://schemas.openxmlformats.org/drawingml/2006/main" xmlns:r="http://schemas.openxmlformats.org/officeDocument/2006/relationships" xmlns:p="http://schemas.openxmlformats.org/presentationml/2006/main">
+  <p:cSld>
+    <p:spTree>
+      <p:nvGrpSpPr>
+        <p:cNvPr id="1" name=""/>
+        <p:cNvGrpSpPr/>
+        <p:nvPr/>
+      </p:nvGrpSpPr>
+      <p:grpSpPr>
+        <a:xfrm>
+          <a:off x="0" y="0"/>
+          <a:ext cx="0" cy="0"/>
+          <a:chOff x="0" y="0"/>
+          <a:chExt cx="0" cy="0"/>
+        </a:xfrm>
+      </p:grpSpPr>
+      <p:sp>
+        <p:nvSpPr>
+          <p:cNvPr id="2" name="Title 1"/>
+          <p:cNvSpPr>
+            <a:spLocks noGrp="1"/>
+          </p:cNvSpPr>
+          <p:nvPr>
+            <p:ph type="title"/>
+          </p:nvPr>
+        </p:nvSpPr>
+        <p:spPr/>
+        <p:txBody>
+          <a:bodyPr/>
+          <a:lstStyle/>
+          <a:p>
+            <a:r>
+              <a:rPr lang="nl-NL"/>
+              <a:t>DIY Extra</a:t>
+            </a:r>
+          </a:p>
+        </p:txBody>
+      </p:sp>
+      <p:sp>
+        <p:nvSpPr>
+          <p:cNvPr id="3" name="Content Placeholder 2"/>
+          <p:cNvSpPr>
+            <a:spLocks noGrp="1"/>
+          </p:cNvSpPr>
+          <p:nvPr>
+            <p:ph idx="1"/>
+          </p:nvPr>
+        </p:nvSpPr>
+        <p:spPr/>
+        <p:txBody>
+          <a:bodyPr/>
+          <a:lstStyle/>
+          <a:p>
+            <a:r>
+              <a:rPr lang="nl-NL" smtClean="0"/>
+              <a:t>SIG Lucas Jellema JET and OpenLayers</a:t>
+            </a:r>
+          </a:p>
+          <a:p>
+            <a:pPr lvl="1"/>
+            <a:r>
+              <a:rPr lang="nl-NL">
+                <a:hlinkClick r:id="rId2"/>
+              </a:rPr>
+              <a:t>https://</a:t>
+            </a:r>
+            <a:r>
+              <a:rPr lang="nl-NL" smtClean="0">
+                <a:hlinkClick r:id="rId2"/>
+              </a:rPr>
+              <a:t>github.com/lucasjellema/sig-meetup-jet-openlayers-composite-components.git</a:t>
+            </a:r>
+            <a:endParaRPr lang="nl-NL" smtClean="0"/>
+          </a:p>
+          <a:p>
+            <a:r>
+              <a:rPr lang="nl-NL" smtClean="0"/>
+              <a:t>Other Knockout tutorials</a:t>
+            </a:r>
+          </a:p>
+          <a:p>
+            <a:pPr lvl="1"/>
+            <a:r>
+              <a:rPr lang="nl-NL">
+                <a:hlinkClick r:id="rId3"/>
+              </a:rPr>
+              <a:t>http://knockoutjs.com</a:t>
+            </a:r>
+            <a:endParaRPr lang="nl-NL"/>
+          </a:p>
+          <a:p>
+            <a:r>
+              <a:rPr lang="nl-NL" smtClean="0"/>
+              <a:t>jQuery tutorials</a:t>
+            </a:r>
+          </a:p>
+          <a:p>
+            <a:pPr lvl="1"/>
+            <a:r>
+              <a:rPr lang="nl-NL">
+                <a:hlinkClick r:id="rId4"/>
+              </a:rPr>
+              <a:t>https://</a:t>
+            </a:r>
+            <a:r>
+              <a:rPr lang="nl-NL" smtClean="0">
+                <a:hlinkClick r:id="rId4"/>
+              </a:rPr>
+              <a:t>www.w3schools.com/jquery/default.asp</a:t>
+            </a:r>
+            <a:endParaRPr lang="nl-NL" smtClean="0"/>
+          </a:p>
+          <a:p>
+            <a:pPr lvl="1"/>
+            <a:r>
+              <a:rPr lang="nl-NL">
+                <a:hlinkClick r:id="rId5"/>
+              </a:rPr>
+              <a:t>http://</a:t>
+            </a:r>
+            <a:r>
+              <a:rPr lang="nl-NL" smtClean="0">
+                <a:hlinkClick r:id="rId5"/>
+              </a:rPr>
+              <a:t>jqfundamentals.com/chapter/jquery-basics</a:t>
+            </a:r>
+            <a:endParaRPr lang="nl-NL" smtClean="0"/>
+          </a:p>
+          <a:p>
+            <a:r>
+              <a:rPr lang="nl-NL" smtClean="0"/>
+              <a:t>JET MOOC</a:t>
+            </a:r>
+          </a:p>
+          <a:p>
+            <a:endParaRPr lang="nl-NL"/>
+          </a:p>
+        </p:txBody>
+      </p:sp>
+      <p:sp>
+        <p:nvSpPr>
+          <p:cNvPr id="4" name="Footer Placeholder 3"/>
+          <p:cNvSpPr>
+            <a:spLocks noGrp="1"/>
+          </p:cNvSpPr>
+          <p:nvPr>
+            <p:ph type="ftr" sz="quarter" idx="11"/>
+          </p:nvPr>
+        </p:nvSpPr>
+        <p:spPr/>
+        <p:txBody>
+          <a:bodyPr/>
+          <a:lstStyle/>
+          <a:p>
+            <a:r>
+              <a:rPr lang="fr-FR" smtClean="0"/>
+              <a:t>Oracle JET Talent Launch 2018</a:t>
+            </a:r>
+            <a:endParaRPr lang="nl-NL" dirty="0"/>
+          </a:p>
+        </p:txBody>
+      </p:sp>
+      <p:sp>
+        <p:nvSpPr>
+          <p:cNvPr id="6" name="Slide Number Placeholder 5"/>
+          <p:cNvSpPr>
+            <a:spLocks noGrp="1"/>
+          </p:cNvSpPr>
+          <p:nvPr>
+            <p:ph type="sldNum" sz="quarter" idx="12"/>
+          </p:nvPr>
+        </p:nvSpPr>
+        <p:spPr/>
+        <p:txBody>
+          <a:bodyPr/>
+          <a:lstStyle/>
+          <a:p>
+            <a:fld id="{14F1411D-0280-154F-AEAC-4C20B7AA46B2}" type="slidenum">
+              <a:rPr lang="nl-NL" smtClean="0"/>
+              <a:t>106</a:t>
+            </a:fld>
+            <a:endParaRPr lang="nl-NL"/>
+          </a:p>
+        </p:txBody>
+      </p:sp>
+    </p:spTree>
+    <p:extLst>
+      <p:ext uri="{BB962C8B-B14F-4D97-AF65-F5344CB8AC3E}">
+        <p14:creationId xmlns:p14="http://schemas.microsoft.com/office/powerpoint/2010/main" val="3619804874"/>
+      </p:ext>
+    </p:extLst>
+  </p:cSld>
+  <p:clrMapOvr>
+    <a:masterClrMapping/>
+  </p:clrMapOvr>
+</p:sld>
+</file>
+
+<file path=ppt/slides/slide107.xml><?xml version="1.0" encoding="utf-8"?>
+<p:sld xmlns:a="http://schemas.openxmlformats.org/drawingml/2006/main" xmlns:r="http://schemas.openxmlformats.org/officeDocument/2006/relationships" xmlns:p="http://schemas.openxmlformats.org/presentationml/2006/main">
+  <p:cSld>
+    <p:spTree>
+      <p:nvGrpSpPr>
+        <p:cNvPr id="1" name=""/>
+        <p:cNvGrpSpPr/>
+        <p:nvPr/>
+      </p:nvGrpSpPr>
+      <p:grpSpPr>
+        <a:xfrm>
+          <a:off x="0" y="0"/>
+          <a:ext cx="0" cy="0"/>
+          <a:chOff x="0" y="0"/>
+          <a:chExt cx="0" cy="0"/>
+        </a:xfrm>
+      </p:grpSpPr>
+      <p:sp>
+        <p:nvSpPr>
+          <p:cNvPr id="2" name="Tijdelijke aanduiding voor voettekst 1"/>
+          <p:cNvSpPr>
+            <a:spLocks noGrp="1"/>
+          </p:cNvSpPr>
+          <p:nvPr>
+            <p:ph type="ftr" sz="quarter" idx="11"/>
+          </p:nvPr>
+        </p:nvSpPr>
+        <p:spPr/>
+        <p:txBody>
+          <a:bodyPr/>
+          <a:lstStyle/>
+          <a:p>
+            <a:r>
+              <a:rPr lang="fr-FR" smtClean="0"/>
+              <a:t>Oracle JET Talent Launch 2018</a:t>
+            </a:r>
             <a:endParaRPr lang="nl-NL"/>
           </a:p>
         </p:txBody>
@@ -9460,7 +10007,7 @@
           <a:p>
             <a:fld id="{14F1411D-0280-154F-AEAC-4C20B7AA46B2}" type="slidenum">
               <a:rPr lang="nl-NL" smtClean="0"/>
-              <a:t>105</a:t>
+              <a:t>107</a:t>
             </a:fld>
             <a:endParaRPr lang="nl-NL"/>
           </a:p>
@@ -19316,11 +19863,7 @@
             </a:r>
             <a:r>
               <a:rPr lang="nl-NL"/>
-              <a:t>”).</a:t>
-            </a:r>
-            <a:r>
-              <a:rPr lang="nl-NL"/>
-              <a:t>click</a:t>
+              <a:t>”).click</a:t>
             </a:r>
             <a:r>
               <a:rPr lang="nl-NL" smtClean="0"/>
@@ -19339,11 +19882,7 @@
             </a:r>
             <a:r>
               <a:rPr lang="nl-NL"/>
-              <a:t>”).</a:t>
-            </a:r>
-            <a:r>
-              <a:rPr lang="nl-NL"/>
-              <a:t>click</a:t>
+              <a:t>”).click</a:t>
             </a:r>
             <a:r>
               <a:rPr lang="nl-NL" smtClean="0"/>
@@ -19516,11 +20055,7 @@
           <a:p>
             <a:r>
               <a:rPr lang="nl-NL"/>
-              <a:t>$.</a:t>
-            </a:r>
-            <a:r>
-              <a:rPr lang="nl-NL"/>
-              <a:t>get(</a:t>
+              <a:t>$.get(</a:t>
             </a:r>
             <a:r>
               <a:rPr lang="nl-NL" i="1"/>
@@ -19534,23 +20069,15 @@
           <a:p>
             <a:r>
               <a:rPr lang="nl-NL"/>
-              <a:t>$.</a:t>
+              <a:t>$.get</a:t>
+            </a:r>
+            <a:r>
+              <a:rPr lang="nl-NL" smtClean="0"/>
+              <a:t>("</a:t>
             </a:r>
             <a:r>
               <a:rPr lang="nl-NL"/>
-              <a:t>get</a:t>
-            </a:r>
-            <a:r>
-              <a:rPr lang="nl-NL" smtClean="0"/>
-              <a:t>("</a:t>
-            </a:r>
-            <a:r>
-              <a:rPr lang="nl-NL"/>
-              <a:t>https</a:t>
-            </a:r>
-            <a:r>
-              <a:rPr lang="nl-NL"/>
-              <a:t>://</a:t>
+              <a:t>https://</a:t>
             </a:r>
             <a:r>
               <a:rPr lang="nl-NL" smtClean="0"/>
@@ -19565,11 +20092,7 @@
             </a:br>
             <a:r>
               <a:rPr lang="nl-NL"/>
-              <a:t>        alert("Data: " </a:t>
-            </a:r>
-            <a:r>
-              <a:rPr lang="nl-NL"/>
-              <a:t>+ </a:t>
+              <a:t>        alert("Data: " + </a:t>
             </a:r>
             <a:r>
               <a:rPr lang="nl-NL" smtClean="0"/>
@@ -19586,7 +20109,6 @@
               <a:rPr lang="nl-NL"/>
               <a:t>    });</a:t>
             </a:r>
-            <a:endParaRPr lang="nl-NL"/>
           </a:p>
           <a:p>
             <a:pPr marL="0" indent="0">
@@ -21050,11 +21572,7 @@
             </a:r>
             <a:r>
               <a:rPr lang="nl-NL" i="1"/>
-              <a:t>var dynamicValue </a:t>
-            </a:r>
-            <a:r>
-              <a:rPr lang="nl-NL" i="1"/>
-              <a:t>= </a:t>
+              <a:t>var dynamicValue = </a:t>
             </a:r>
             <a:r>
               <a:rPr lang="nl-NL" i="1" smtClean="0"/>
@@ -24588,7 +25106,7 @@
                 <a:gridCol w="3048000">
                   <a:extLst>
                     <a:ext uri="{9D8B030D-6E8A-4147-A177-3AD203B41FA5}">
-                      <a16:colId xmlns:a16="http://schemas.microsoft.com/office/drawing/2014/main" xmlns="" val="142243291"/>
+                      <a16:colId xmlns="" xmlns:a16="http://schemas.microsoft.com/office/drawing/2014/main" val="142243291"/>
                     </a:ext>
                   </a:extLst>
                 </a:gridCol>
@@ -24618,7 +25136,7 @@
                 </a:tc>
                 <a:extLst>
                   <a:ext uri="{0D108BD9-81ED-4DB2-BD59-A6C34878D82A}">
-                    <a16:rowId xmlns:a16="http://schemas.microsoft.com/office/drawing/2014/main" xmlns="" val="4057669028"/>
+                    <a16:rowId xmlns="" xmlns:a16="http://schemas.microsoft.com/office/drawing/2014/main" val="4057669028"/>
                   </a:ext>
                 </a:extLst>
               </a:tr>
@@ -24837,7 +25355,7 @@
                 <a:gridCol w="3744911">
                   <a:extLst>
                     <a:ext uri="{9D8B030D-6E8A-4147-A177-3AD203B41FA5}">
-                      <a16:colId xmlns:a16="http://schemas.microsoft.com/office/drawing/2014/main" xmlns="" val="1909856764"/>
+                      <a16:colId xmlns="" xmlns:a16="http://schemas.microsoft.com/office/drawing/2014/main" val="1909856764"/>
                     </a:ext>
                   </a:extLst>
                 </a:gridCol>
@@ -24867,7 +25385,7 @@
                 </a:tc>
                 <a:extLst>
                   <a:ext uri="{0D108BD9-81ED-4DB2-BD59-A6C34878D82A}">
-                    <a16:rowId xmlns:a16="http://schemas.microsoft.com/office/drawing/2014/main" xmlns="" val="2221021415"/>
+                    <a16:rowId xmlns="" xmlns:a16="http://schemas.microsoft.com/office/drawing/2014/main" val="2221021415"/>
                   </a:ext>
                 </a:extLst>
               </a:tr>
@@ -24887,7 +25405,7 @@
                 </a:tc>
                 <a:extLst>
                   <a:ext uri="{0D108BD9-81ED-4DB2-BD59-A6C34878D82A}">
-                    <a16:rowId xmlns:a16="http://schemas.microsoft.com/office/drawing/2014/main" xmlns="" val="3785831217"/>
+                    <a16:rowId xmlns="" xmlns:a16="http://schemas.microsoft.com/office/drawing/2014/main" val="3785831217"/>
                   </a:ext>
                 </a:extLst>
               </a:tr>
@@ -24924,7 +25442,7 @@
                 </a:tc>
                 <a:extLst>
                   <a:ext uri="{0D108BD9-81ED-4DB2-BD59-A6C34878D82A}">
-                    <a16:rowId xmlns:a16="http://schemas.microsoft.com/office/drawing/2014/main" xmlns="" val="1577332384"/>
+                    <a16:rowId xmlns="" xmlns:a16="http://schemas.microsoft.com/office/drawing/2014/main" val="1577332384"/>
                   </a:ext>
                 </a:extLst>
               </a:tr>
@@ -24961,7 +25479,7 @@
                 </a:tc>
                 <a:extLst>
                   <a:ext uri="{0D108BD9-81ED-4DB2-BD59-A6C34878D82A}">
-                    <a16:rowId xmlns:a16="http://schemas.microsoft.com/office/drawing/2014/main" xmlns="" val="2364899398"/>
+                    <a16:rowId xmlns="" xmlns:a16="http://schemas.microsoft.com/office/drawing/2014/main" val="2364899398"/>
                   </a:ext>
                 </a:extLst>
               </a:tr>
@@ -29877,7 +30395,7 @@
       </p:grpSpPr>
       <p:sp>
         <p:nvSpPr>
-          <p:cNvPr id="2" name="Title 1"/>
+          <p:cNvPr id="2" name="Titel 1"/>
           <p:cNvSpPr>
             <a:spLocks noGrp="1"/>
           </p:cNvSpPr>
@@ -29900,6 +30418,171 @@
       </p:sp>
       <p:sp>
         <p:nvSpPr>
+          <p:cNvPr id="4" name="Tijdelijke aanduiding voor voettekst 3"/>
+          <p:cNvSpPr>
+            <a:spLocks noGrp="1"/>
+          </p:cNvSpPr>
+          <p:nvPr>
+            <p:ph type="ftr" sz="quarter" idx="11"/>
+          </p:nvPr>
+        </p:nvSpPr>
+        <p:spPr/>
+        <p:txBody>
+          <a:bodyPr/>
+          <a:lstStyle/>
+          <a:p>
+            <a:r>
+              <a:rPr lang="fr-FR" smtClean="0"/>
+              <a:t>Oracle JET Talent Launch 2018</a:t>
+            </a:r>
+            <a:endParaRPr lang="nl-NL"/>
+          </a:p>
+        </p:txBody>
+      </p:sp>
+      <p:sp>
+        <p:nvSpPr>
+          <p:cNvPr id="5" name="Tijdelijke aanduiding voor dianummer 4"/>
+          <p:cNvSpPr>
+            <a:spLocks noGrp="1"/>
+          </p:cNvSpPr>
+          <p:nvPr>
+            <p:ph type="sldNum" sz="quarter" idx="12"/>
+          </p:nvPr>
+        </p:nvSpPr>
+        <p:spPr/>
+        <p:txBody>
+          <a:bodyPr/>
+          <a:lstStyle/>
+          <a:p>
+            <a:fld id="{14F1411D-0280-154F-AEAC-4C20B7AA46B2}" type="slidenum">
+              <a:rPr lang="nl-NL" smtClean="0"/>
+              <a:t>87</a:t>
+            </a:fld>
+            <a:endParaRPr lang="nl-NL"/>
+          </a:p>
+        </p:txBody>
+      </p:sp>
+      <p:sp>
+        <p:nvSpPr>
+          <p:cNvPr id="6" name="Tijdelijke aanduiding voor tekst 5"/>
+          <p:cNvSpPr>
+            <a:spLocks noGrp="1"/>
+          </p:cNvSpPr>
+          <p:nvPr>
+            <p:ph type="body" idx="13"/>
+          </p:nvPr>
+        </p:nvSpPr>
+        <p:spPr/>
+        <p:txBody>
+          <a:bodyPr/>
+          <a:lstStyle/>
+          <a:p>
+            <a:r>
+              <a:rPr lang="nl-NL" dirty="0" smtClean="0"/>
+              <a:t>MVVM</a:t>
+            </a:r>
+            <a:endParaRPr lang="nl-NL" dirty="0"/>
+          </a:p>
+        </p:txBody>
+      </p:sp>
+      <p:pic>
+        <p:nvPicPr>
+          <p:cNvPr id="1026" name="Picture 2" descr="Description of GUID-1F309112-2F44-4B38-9800-4B186B0905E3-default.png follows"/>
+          <p:cNvPicPr>
+            <a:picLocks noGrp="1" noChangeAspect="1" noChangeArrowheads="1"/>
+          </p:cNvPicPr>
+          <p:nvPr>
+            <p:ph idx="1"/>
+          </p:nvPr>
+        </p:nvPicPr>
+        <p:blipFill>
+          <a:blip r:embed="rId2">
+            <a:extLst>
+              <a:ext uri="{28A0092B-C50C-407E-A947-70E740481C1C}">
+                <a14:useLocalDpi xmlns:a14="http://schemas.microsoft.com/office/drawing/2010/main" val="0"/>
+              </a:ext>
+            </a:extLst>
+          </a:blip>
+          <a:srcRect/>
+          <a:stretch>
+            <a:fillRect/>
+          </a:stretch>
+        </p:blipFill>
+        <p:spPr bwMode="auto">
+          <a:xfrm>
+            <a:off x="1125794" y="1274982"/>
+            <a:ext cx="6355877" cy="2809714"/>
+          </a:xfrm>
+          <a:prstGeom prst="rect">
+            <a:avLst/>
+          </a:prstGeom>
+          <a:noFill/>
+          <a:extLst>
+            <a:ext uri="{909E8E84-426E-40DD-AFC4-6F175D3DCCD1}">
+              <a14:hiddenFill xmlns:a14="http://schemas.microsoft.com/office/drawing/2010/main">
+                <a:solidFill>
+                  <a:srgbClr val="FFFFFF"/>
+                </a:solidFill>
+              </a14:hiddenFill>
+            </a:ext>
+          </a:extLst>
+        </p:spPr>
+      </p:pic>
+    </p:spTree>
+    <p:extLst>
+      <p:ext uri="{BB962C8B-B14F-4D97-AF65-F5344CB8AC3E}">
+        <p14:creationId xmlns:p14="http://schemas.microsoft.com/office/powerpoint/2010/main" val="1376912674"/>
+      </p:ext>
+    </p:extLst>
+  </p:cSld>
+  <p:clrMapOvr>
+    <a:masterClrMapping/>
+  </p:clrMapOvr>
+</p:sld>
+</file>
+
+<file path=ppt/slides/slide88.xml><?xml version="1.0" encoding="utf-8"?>
+<p:sld xmlns:a="http://schemas.openxmlformats.org/drawingml/2006/main" xmlns:r="http://schemas.openxmlformats.org/officeDocument/2006/relationships" xmlns:p="http://schemas.openxmlformats.org/presentationml/2006/main">
+  <p:cSld>
+    <p:spTree>
+      <p:nvGrpSpPr>
+        <p:cNvPr id="1" name=""/>
+        <p:cNvGrpSpPr/>
+        <p:nvPr/>
+      </p:nvGrpSpPr>
+      <p:grpSpPr>
+        <a:xfrm>
+          <a:off x="0" y="0"/>
+          <a:ext cx="0" cy="0"/>
+          <a:chOff x="0" y="0"/>
+          <a:chExt cx="0" cy="0"/>
+        </a:xfrm>
+      </p:grpSpPr>
+      <p:sp>
+        <p:nvSpPr>
+          <p:cNvPr id="2" name="Title 1"/>
+          <p:cNvSpPr>
+            <a:spLocks noGrp="1"/>
+          </p:cNvSpPr>
+          <p:nvPr>
+            <p:ph type="title"/>
+          </p:nvPr>
+        </p:nvSpPr>
+        <p:spPr/>
+        <p:txBody>
+          <a:bodyPr/>
+          <a:lstStyle/>
+          <a:p>
+            <a:r>
+              <a:rPr lang="nl-NL" dirty="0" smtClean="0"/>
+              <a:t>Architecture</a:t>
+            </a:r>
+            <a:endParaRPr lang="nl-NL" dirty="0"/>
+          </a:p>
+        </p:txBody>
+      </p:sp>
+      <p:sp>
+        <p:nvSpPr>
           <p:cNvPr id="3" name="Content Placeholder 2"/>
           <p:cNvSpPr>
             <a:spLocks noGrp="1"/>
@@ -29912,6 +30595,12 @@
         <p:txBody>
           <a:bodyPr/>
           <a:lstStyle/>
+          <a:p>
+            <a:r>
+              <a:rPr lang="nl-NL" dirty="0" smtClean="0"/>
+              <a:t>SPA</a:t>
+            </a:r>
+          </a:p>
           <a:p>
             <a:r>
               <a:rPr lang="nl-NL" dirty="0" smtClean="0"/>
@@ -29929,15 +30618,6 @@
               <a:t>Router state</a:t>
             </a:r>
           </a:p>
-          <a:p>
-            <a:r>
-              <a:rPr lang="nl-NL" dirty="0" smtClean="0"/>
-              <a:t>Store information on router</a:t>
-            </a:r>
-          </a:p>
-          <a:p>
-            <a:endParaRPr lang="nl-NL" dirty="0"/>
-          </a:p>
         </p:txBody>
       </p:sp>
       <p:sp>
@@ -29959,6 +30639,29 @@
               <a:rPr lang="fr-FR" smtClean="0"/>
               <a:t>Oracle JET Talent Launch 2018</a:t>
             </a:r>
+            <a:endParaRPr lang="nl-NL"/>
+          </a:p>
+        </p:txBody>
+      </p:sp>
+      <p:sp>
+        <p:nvSpPr>
+          <p:cNvPr id="5" name="Slide Number Placeholder 4"/>
+          <p:cNvSpPr>
+            <a:spLocks noGrp="1"/>
+          </p:cNvSpPr>
+          <p:nvPr>
+            <p:ph type="sldNum" sz="quarter" idx="12"/>
+          </p:nvPr>
+        </p:nvSpPr>
+        <p:spPr/>
+        <p:txBody>
+          <a:bodyPr/>
+          <a:lstStyle/>
+          <a:p>
+            <a:fld id="{14F1411D-0280-154F-AEAC-4C20B7AA46B2}" type="slidenum">
+              <a:rPr lang="nl-NL" smtClean="0"/>
+              <a:t>88</a:t>
+            </a:fld>
             <a:endParaRPr lang="nl-NL"/>
           </a:p>
         </p:txBody>
@@ -30138,383 +30841,10 @@
           </a:fontRef>
         </p:style>
       </p:cxnSp>
-      <p:sp>
-        <p:nvSpPr>
-          <p:cNvPr id="9" name="Slide Number Placeholder 8"/>
-          <p:cNvSpPr>
-            <a:spLocks noGrp="1"/>
-          </p:cNvSpPr>
-          <p:nvPr>
-            <p:ph type="sldNum" sz="quarter" idx="12"/>
-          </p:nvPr>
-        </p:nvSpPr>
-        <p:spPr/>
-        <p:txBody>
-          <a:bodyPr/>
-          <a:lstStyle/>
-          <a:p>
-            <a:fld id="{14F1411D-0280-154F-AEAC-4C20B7AA46B2}" type="slidenum">
-              <a:rPr lang="nl-NL" smtClean="0"/>
-              <a:t>87</a:t>
-            </a:fld>
-            <a:endParaRPr lang="nl-NL"/>
-          </a:p>
-        </p:txBody>
-      </p:sp>
     </p:spTree>
     <p:extLst>
       <p:ext uri="{BB962C8B-B14F-4D97-AF65-F5344CB8AC3E}">
-        <p14:creationId xmlns:p14="http://schemas.microsoft.com/office/powerpoint/2010/main" val="372698193"/>
-      </p:ext>
-    </p:extLst>
-  </p:cSld>
-  <p:clrMapOvr>
-    <a:masterClrMapping/>
-  </p:clrMapOvr>
-</p:sld>
-</file>
-
-<file path=ppt/slides/slide88.xml><?xml version="1.0" encoding="utf-8"?>
-<p:sld xmlns:a="http://schemas.openxmlformats.org/drawingml/2006/main" xmlns:r="http://schemas.openxmlformats.org/officeDocument/2006/relationships" xmlns:p="http://schemas.openxmlformats.org/presentationml/2006/main">
-  <p:cSld>
-    <p:spTree>
-      <p:nvGrpSpPr>
-        <p:cNvPr id="1" name=""/>
-        <p:cNvGrpSpPr/>
-        <p:nvPr/>
-      </p:nvGrpSpPr>
-      <p:grpSpPr>
-        <a:xfrm>
-          <a:off x="0" y="0"/>
-          <a:ext cx="0" cy="0"/>
-          <a:chOff x="0" y="0"/>
-          <a:chExt cx="0" cy="0"/>
-        </a:xfrm>
-      </p:grpSpPr>
-      <p:sp>
-        <p:nvSpPr>
-          <p:cNvPr id="2" name="Tijdelijke aanduiding voor voettekst 1"/>
-          <p:cNvSpPr>
-            <a:spLocks noGrp="1"/>
-          </p:cNvSpPr>
-          <p:nvPr>
-            <p:ph type="ftr" sz="quarter" idx="11"/>
-          </p:nvPr>
-        </p:nvSpPr>
-        <p:spPr/>
-        <p:txBody>
-          <a:bodyPr/>
-          <a:lstStyle/>
-          <a:p>
-            <a:r>
-              <a:rPr lang="fr-FR" smtClean="0"/>
-              <a:t>Oracle JET Talent Launch 2018</a:t>
-            </a:r>
-            <a:endParaRPr lang="nl-NL"/>
-          </a:p>
-        </p:txBody>
-      </p:sp>
-      <p:sp>
-        <p:nvSpPr>
-          <p:cNvPr id="4" name="Titel 3"/>
-          <p:cNvSpPr>
-            <a:spLocks noGrp="1"/>
-          </p:cNvSpPr>
-          <p:nvPr>
-            <p:ph type="title"/>
-          </p:nvPr>
-        </p:nvSpPr>
-        <p:spPr/>
-        <p:txBody>
-          <a:bodyPr/>
-          <a:lstStyle/>
-          <a:p>
-            <a:r>
-              <a:rPr lang="nl-NL" dirty="0" smtClean="0"/>
-              <a:t>Architecture</a:t>
-            </a:r>
-            <a:endParaRPr lang="nl-NL" dirty="0"/>
-          </a:p>
-        </p:txBody>
-      </p:sp>
-      <p:sp>
-        <p:nvSpPr>
-          <p:cNvPr id="5" name="Tijdelijke aanduiding voor inhoud 4"/>
-          <p:cNvSpPr>
-            <a:spLocks noGrp="1"/>
-          </p:cNvSpPr>
-          <p:nvPr>
-            <p:ph idx="1"/>
-          </p:nvPr>
-        </p:nvSpPr>
-        <p:spPr/>
-        <p:txBody>
-          <a:bodyPr/>
-          <a:lstStyle/>
-          <a:p>
-            <a:pPr marL="0" indent="0">
-              <a:buNone/>
-            </a:pPr>
-            <a:r>
-              <a:rPr lang="nl-NL" dirty="0" smtClean="0"/>
-              <a:t>“Manages content </a:t>
-            </a:r>
-            <a:r>
-              <a:rPr lang="nl-NL" dirty="0" err="1" smtClean="0"/>
-              <a:t>replacement</a:t>
-            </a:r>
-            <a:r>
-              <a:rPr lang="nl-NL" dirty="0" smtClean="0"/>
-              <a:t>”</a:t>
-            </a:r>
-          </a:p>
-          <a:p>
-            <a:pPr marL="0" indent="0">
-              <a:buNone/>
-            </a:pPr>
-            <a:endParaRPr lang="nl-NL" dirty="0" smtClean="0"/>
-          </a:p>
-          <a:p>
-            <a:r>
-              <a:rPr lang="nl-NL" dirty="0" err="1" smtClean="0"/>
-              <a:t>Used</a:t>
-            </a:r>
-            <a:r>
-              <a:rPr lang="nl-NL" dirty="0" smtClean="0"/>
-              <a:t> </a:t>
-            </a:r>
-            <a:r>
-              <a:rPr lang="nl-NL" dirty="0" err="1" smtClean="0"/>
-              <a:t>by</a:t>
-            </a:r>
-            <a:r>
-              <a:rPr lang="nl-NL" dirty="0" smtClean="0"/>
-              <a:t> router </a:t>
-            </a:r>
-            <a:r>
-              <a:rPr lang="nl-NL" dirty="0" err="1" smtClean="0"/>
-              <a:t>for</a:t>
-            </a:r>
-            <a:r>
-              <a:rPr lang="nl-NL" dirty="0" smtClean="0"/>
-              <a:t> </a:t>
-            </a:r>
-            <a:r>
-              <a:rPr lang="nl-NL" dirty="0" err="1" smtClean="0"/>
-              <a:t>navigation</a:t>
-            </a:r>
-            <a:endParaRPr lang="nl-NL" dirty="0"/>
-          </a:p>
-        </p:txBody>
-      </p:sp>
-      <p:sp>
-        <p:nvSpPr>
-          <p:cNvPr id="6" name="Tijdelijke aanduiding voor tekst 5"/>
-          <p:cNvSpPr>
-            <a:spLocks noGrp="1"/>
-          </p:cNvSpPr>
-          <p:nvPr>
-            <p:ph type="body" idx="13"/>
-          </p:nvPr>
-        </p:nvSpPr>
-        <p:spPr/>
-        <p:txBody>
-          <a:bodyPr/>
-          <a:lstStyle/>
-          <a:p>
-            <a:r>
-              <a:rPr lang="nl-NL" dirty="0" err="1" smtClean="0"/>
-              <a:t>ojModule</a:t>
-            </a:r>
-            <a:endParaRPr lang="nl-NL" dirty="0"/>
-          </a:p>
-        </p:txBody>
-      </p:sp>
-      <p:sp>
-        <p:nvSpPr>
-          <p:cNvPr id="7" name="Tijdelijke aanduiding voor inhoud 6"/>
-          <p:cNvSpPr>
-            <a:spLocks noGrp="1"/>
-          </p:cNvSpPr>
-          <p:nvPr>
-            <p:ph idx="14"/>
-          </p:nvPr>
-        </p:nvSpPr>
-        <p:spPr/>
-        <p:txBody>
-          <a:bodyPr/>
-          <a:lstStyle/>
-          <a:p>
-            <a:pPr marL="0" indent="0">
-              <a:buNone/>
-            </a:pPr>
-            <a:r>
-              <a:rPr lang="nl-NL" dirty="0" smtClean="0"/>
-              <a:t>“</a:t>
-            </a:r>
-            <a:r>
-              <a:rPr lang="nl-NL" dirty="0" err="1" smtClean="0"/>
-              <a:t>Reusable</a:t>
-            </a:r>
-            <a:r>
-              <a:rPr lang="nl-NL" dirty="0" smtClean="0"/>
-              <a:t> piece of UI”</a:t>
-            </a:r>
-          </a:p>
-          <a:p>
-            <a:pPr marL="0" indent="0">
-              <a:buNone/>
-            </a:pPr>
-            <a:endParaRPr lang="nl-NL" dirty="0"/>
-          </a:p>
-          <a:p>
-            <a:r>
-              <a:rPr lang="nl-NL" dirty="0" smtClean="0"/>
-              <a:t>Has </a:t>
-            </a:r>
-            <a:r>
-              <a:rPr lang="nl-NL" dirty="0" err="1" smtClean="0"/>
-              <a:t>own</a:t>
-            </a:r>
-            <a:r>
-              <a:rPr lang="nl-NL" dirty="0" smtClean="0"/>
-              <a:t> html / JS / CSS</a:t>
-            </a:r>
-          </a:p>
-          <a:p>
-            <a:r>
-              <a:rPr lang="nl-NL" dirty="0" smtClean="0"/>
-              <a:t>Works on </a:t>
-            </a:r>
-            <a:r>
-              <a:rPr lang="nl-NL" dirty="0" err="1" smtClean="0"/>
-              <a:t>it’s</a:t>
-            </a:r>
-            <a:r>
-              <a:rPr lang="nl-NL" dirty="0" smtClean="0"/>
-              <a:t> </a:t>
-            </a:r>
-            <a:r>
-              <a:rPr lang="nl-NL" dirty="0" err="1" smtClean="0"/>
-              <a:t>own</a:t>
-            </a:r>
-            <a:r>
-              <a:rPr lang="nl-NL" dirty="0" smtClean="0"/>
-              <a:t> or </a:t>
-            </a:r>
-            <a:r>
-              <a:rPr lang="nl-NL" dirty="0" err="1" smtClean="0"/>
-              <a:t>with</a:t>
-            </a:r>
-            <a:r>
-              <a:rPr lang="nl-NL" dirty="0" smtClean="0"/>
-              <a:t> input </a:t>
-            </a:r>
-            <a:r>
-              <a:rPr lang="nl-NL" dirty="0" err="1" smtClean="0"/>
-              <a:t>from</a:t>
-            </a:r>
-            <a:r>
-              <a:rPr lang="nl-NL" dirty="0" smtClean="0"/>
-              <a:t> </a:t>
-            </a:r>
-            <a:r>
-              <a:rPr lang="nl-NL" dirty="0" err="1" smtClean="0"/>
-              <a:t>parent-application</a:t>
-            </a:r>
-            <a:endParaRPr lang="nl-NL" dirty="0" smtClean="0"/>
-          </a:p>
-          <a:p>
-            <a:pPr marL="0" indent="0">
-              <a:buNone/>
-            </a:pPr>
-            <a:endParaRPr lang="nl-NL" dirty="0"/>
-          </a:p>
-        </p:txBody>
-      </p:sp>
-      <p:sp>
-        <p:nvSpPr>
-          <p:cNvPr id="8" name="Tijdelijke aanduiding voor tekst 7"/>
-          <p:cNvSpPr>
-            <a:spLocks noGrp="1"/>
-          </p:cNvSpPr>
-          <p:nvPr>
-            <p:ph type="body" idx="15"/>
-          </p:nvPr>
-        </p:nvSpPr>
-        <p:spPr/>
-        <p:txBody>
-          <a:bodyPr/>
-          <a:lstStyle/>
-          <a:p>
-            <a:r>
-              <a:rPr lang="nl-NL" dirty="0" err="1" smtClean="0"/>
-              <a:t>Composite</a:t>
-            </a:r>
-            <a:r>
-              <a:rPr lang="nl-NL" dirty="0" smtClean="0"/>
-              <a:t> Component</a:t>
-            </a:r>
-            <a:endParaRPr lang="nl-NL" dirty="0"/>
-          </a:p>
-        </p:txBody>
-      </p:sp>
-      <p:sp>
-        <p:nvSpPr>
-          <p:cNvPr id="9" name="Tekstvak 8"/>
-          <p:cNvSpPr txBox="1"/>
-          <p:nvPr/>
-        </p:nvSpPr>
-        <p:spPr>
-          <a:xfrm>
-            <a:off x="1233948" y="3462894"/>
-            <a:ext cx="6676104" cy="1107996"/>
-          </a:xfrm>
-          <a:prstGeom prst="rect">
-            <a:avLst/>
-          </a:prstGeom>
-          <a:noFill/>
-        </p:spPr>
-        <p:txBody>
-          <a:bodyPr wrap="square" lIns="0" tIns="0" rIns="0" bIns="0" rtlCol="0">
-            <a:spAutoFit/>
-          </a:bodyPr>
-          <a:lstStyle/>
-          <a:p>
-            <a:r>
-              <a:rPr lang="nl-NL" sz="7200" dirty="0" smtClean="0"/>
-              <a:t>Clean codebase</a:t>
-            </a:r>
-          </a:p>
-        </p:txBody>
-      </p:sp>
-      <p:sp>
-        <p:nvSpPr>
-          <p:cNvPr id="10" name="Slide Number Placeholder 9"/>
-          <p:cNvSpPr>
-            <a:spLocks noGrp="1"/>
-          </p:cNvSpPr>
-          <p:nvPr>
-            <p:ph type="sldNum" sz="quarter" idx="12"/>
-          </p:nvPr>
-        </p:nvSpPr>
-        <p:spPr/>
-        <p:txBody>
-          <a:bodyPr/>
-          <a:lstStyle/>
-          <a:p>
-            <a:fld id="{14F1411D-0280-154F-AEAC-4C20B7AA46B2}" type="slidenum">
-              <a:rPr lang="nl-NL" smtClean="0"/>
-              <a:t>88</a:t>
-            </a:fld>
-            <a:endParaRPr lang="nl-NL"/>
-          </a:p>
-        </p:txBody>
-      </p:sp>
-    </p:spTree>
-    <p:extLst>
-      <p:ext uri="{BB962C8B-B14F-4D97-AF65-F5344CB8AC3E}">
-        <p14:creationId xmlns:p14="http://schemas.microsoft.com/office/powerpoint/2010/main" val="3127566034"/>
+        <p14:creationId xmlns:p14="http://schemas.microsoft.com/office/powerpoint/2010/main" val="1400159404"/>
       </p:ext>
     </p:extLst>
   </p:cSld>
@@ -30543,7 +30873,7 @@
       </p:grpSpPr>
       <p:sp>
         <p:nvSpPr>
-          <p:cNvPr id="2" name="Titel 1"/>
+          <p:cNvPr id="2" name="Title 1"/>
           <p:cNvSpPr>
             <a:spLocks noGrp="1"/>
           </p:cNvSpPr>
@@ -30566,7 +30896,7 @@
       </p:sp>
       <p:sp>
         <p:nvSpPr>
-          <p:cNvPr id="3" name="Tijdelijke aanduiding voor inhoud 2"/>
+          <p:cNvPr id="3" name="Content Placeholder 2"/>
           <p:cNvSpPr>
             <a:spLocks noGrp="1"/>
           </p:cNvSpPr>
@@ -30579,34 +30909,25 @@
           <a:bodyPr/>
           <a:lstStyle/>
           <a:p>
+            <a:pPr marL="0" indent="0">
+              <a:buNone/>
+            </a:pPr>
             <a:r>
               <a:rPr lang="nl-NL" dirty="0" smtClean="0"/>
-              <a:t>Al iets over MVVM in eerste stuk?</a:t>
-            </a:r>
-          </a:p>
-          <a:p>
-            <a:r>
-              <a:rPr lang="nl-NL" dirty="0">
-                <a:hlinkClick r:id="rId2"/>
-              </a:rPr>
-              <a:t>https://</a:t>
-            </a:r>
-            <a:r>
-              <a:rPr lang="nl-NL" dirty="0" smtClean="0">
-                <a:hlinkClick r:id="rId2"/>
-              </a:rPr>
-              <a:t>docs.oracle.com/middleware/jet410/jet/developer/GUID-293CB342-196F-4FC3-AE69-D1226A025FBB.htm#JETDG113</a:t>
-            </a:r>
-            <a:endParaRPr lang="nl-NL" dirty="0" smtClean="0"/>
-          </a:p>
-          <a:p>
+              <a:t>Store information</a:t>
+            </a:r>
+          </a:p>
+          <a:p>
+            <a:pPr marL="0" indent="0">
+              <a:buNone/>
+            </a:pPr>
             <a:endParaRPr lang="nl-NL" dirty="0"/>
           </a:p>
         </p:txBody>
       </p:sp>
       <p:sp>
         <p:nvSpPr>
-          <p:cNvPr id="4" name="Tijdelijke aanduiding voor voettekst 3"/>
+          <p:cNvPr id="4" name="Footer Placeholder 3"/>
           <p:cNvSpPr>
             <a:spLocks noGrp="1"/>
           </p:cNvSpPr>
@@ -30629,30 +30950,7 @@
       </p:sp>
       <p:sp>
         <p:nvSpPr>
-          <p:cNvPr id="6" name="Tijdelijke aanduiding voor tekst 5"/>
-          <p:cNvSpPr>
-            <a:spLocks noGrp="1"/>
-          </p:cNvSpPr>
-          <p:nvPr>
-            <p:ph type="body" idx="13"/>
-          </p:nvPr>
-        </p:nvSpPr>
-        <p:spPr/>
-        <p:txBody>
-          <a:bodyPr/>
-          <a:lstStyle/>
-          <a:p>
-            <a:r>
-              <a:rPr lang="nl-NL" dirty="0" smtClean="0"/>
-              <a:t>Verder nog?</a:t>
-            </a:r>
-            <a:endParaRPr lang="nl-NL" dirty="0"/>
-          </a:p>
-        </p:txBody>
-      </p:sp>
-      <p:sp>
-        <p:nvSpPr>
-          <p:cNvPr id="7" name="Slide Number Placeholder 6"/>
+          <p:cNvPr id="5" name="Slide Number Placeholder 4"/>
           <p:cNvSpPr>
             <a:spLocks noGrp="1"/>
           </p:cNvSpPr>
@@ -30673,10 +30971,117 @@
           </a:p>
         </p:txBody>
       </p:sp>
+      <p:sp>
+        <p:nvSpPr>
+          <p:cNvPr id="6" name="Text Placeholder 5"/>
+          <p:cNvSpPr>
+            <a:spLocks noGrp="1"/>
+          </p:cNvSpPr>
+          <p:nvPr>
+            <p:ph type="body" idx="13"/>
+          </p:nvPr>
+        </p:nvSpPr>
+        <p:spPr/>
+        <p:txBody>
+          <a:bodyPr/>
+          <a:lstStyle/>
+          <a:p>
+            <a:r>
+              <a:rPr lang="nl-NL" dirty="0" smtClean="0"/>
+              <a:t>Routing</a:t>
+            </a:r>
+            <a:endParaRPr lang="nl-NL" dirty="0"/>
+          </a:p>
+        </p:txBody>
+      </p:sp>
+      <p:pic>
+        <p:nvPicPr>
+          <p:cNvPr id="9" name="Afbeelding 8"/>
+          <p:cNvPicPr>
+            <a:picLocks noChangeAspect="1"/>
+          </p:cNvPicPr>
+          <p:nvPr/>
+        </p:nvPicPr>
+        <p:blipFill>
+          <a:blip r:embed="rId2"/>
+          <a:stretch>
+            <a:fillRect/>
+          </a:stretch>
+        </p:blipFill>
+        <p:spPr>
+          <a:xfrm>
+            <a:off x="720003" y="1788168"/>
+            <a:ext cx="7445443" cy="382710"/>
+          </a:xfrm>
+          <a:prstGeom prst="rect">
+            <a:avLst/>
+          </a:prstGeom>
+        </p:spPr>
+      </p:pic>
+      <p:pic>
+        <p:nvPicPr>
+          <p:cNvPr id="32" name="Afbeelding 31"/>
+          <p:cNvPicPr>
+            <a:picLocks noChangeAspect="1"/>
+          </p:cNvPicPr>
+          <p:nvPr/>
+        </p:nvPicPr>
+        <p:blipFill>
+          <a:blip r:embed="rId3"/>
+          <a:stretch>
+            <a:fillRect/>
+          </a:stretch>
+        </p:blipFill>
+        <p:spPr>
+          <a:xfrm>
+            <a:off x="660792" y="2856086"/>
+            <a:ext cx="5380338" cy="621920"/>
+          </a:xfrm>
+          <a:prstGeom prst="rect">
+            <a:avLst/>
+          </a:prstGeom>
+        </p:spPr>
+      </p:pic>
+      <p:cxnSp>
+        <p:nvCxnSpPr>
+          <p:cNvPr id="17" name="Rechte verbindingslijn met pijl 16"/>
+          <p:cNvCxnSpPr/>
+          <p:nvPr/>
+        </p:nvCxnSpPr>
+        <p:spPr>
+          <a:xfrm>
+            <a:off x="2499799" y="2091658"/>
+            <a:ext cx="2468201" cy="822581"/>
+          </a:xfrm>
+          <a:prstGeom prst="straightConnector1">
+            <a:avLst/>
+          </a:prstGeom>
+          <a:ln w="12700">
+            <a:solidFill>
+              <a:schemeClr val="tx2"/>
+            </a:solidFill>
+            <a:tailEnd type="triangle"/>
+          </a:ln>
+        </p:spPr>
+        <p:style>
+          <a:lnRef idx="1">
+            <a:schemeClr val="accent1"/>
+          </a:lnRef>
+          <a:fillRef idx="0">
+            <a:schemeClr val="accent1"/>
+          </a:fillRef>
+          <a:effectRef idx="0">
+            <a:schemeClr val="accent1"/>
+          </a:effectRef>
+          <a:fontRef idx="minor">
+            <a:schemeClr val="tx1"/>
+          </a:fontRef>
+        </p:style>
+      </p:cxnSp>
     </p:spTree>
     <p:extLst>
       <p:ext uri="{BB962C8B-B14F-4D97-AF65-F5344CB8AC3E}">
-        <p14:creationId xmlns:p14="http://schemas.microsoft.com/office/powerpoint/2010/main" val="3976256252"/>
+        <p14:creationId xmlns:p14="http://schemas.microsoft.com/office/powerpoint/2010/main" val="2653321876"/>
       </p:ext>
     </p:extLst>
   </p:cSld>
@@ -30902,7 +31307,53 @@
       </p:grpSpPr>
       <p:sp>
         <p:nvSpPr>
-          <p:cNvPr id="2" name="Title 1"/>
+          <p:cNvPr id="2" name="Tijdelijke aanduiding voor voettekst 1"/>
+          <p:cNvSpPr>
+            <a:spLocks noGrp="1"/>
+          </p:cNvSpPr>
+          <p:nvPr>
+            <p:ph type="ftr" sz="quarter" idx="11"/>
+          </p:nvPr>
+        </p:nvSpPr>
+        <p:spPr/>
+        <p:txBody>
+          <a:bodyPr/>
+          <a:lstStyle/>
+          <a:p>
+            <a:r>
+              <a:rPr lang="fr-FR" smtClean="0"/>
+              <a:t>Oracle JET Talent Launch 2018</a:t>
+            </a:r>
+            <a:endParaRPr lang="nl-NL"/>
+          </a:p>
+        </p:txBody>
+      </p:sp>
+      <p:sp>
+        <p:nvSpPr>
+          <p:cNvPr id="3" name="Tijdelijke aanduiding voor dianummer 2"/>
+          <p:cNvSpPr>
+            <a:spLocks noGrp="1"/>
+          </p:cNvSpPr>
+          <p:nvPr>
+            <p:ph type="sldNum" sz="quarter" idx="12"/>
+          </p:nvPr>
+        </p:nvSpPr>
+        <p:spPr/>
+        <p:txBody>
+          <a:bodyPr/>
+          <a:lstStyle/>
+          <a:p>
+            <a:fld id="{14F1411D-0280-154F-AEAC-4C20B7AA46B2}" type="slidenum">
+              <a:rPr lang="nl-NL" smtClean="0"/>
+              <a:t>90</a:t>
+            </a:fld>
+            <a:endParaRPr lang="nl-NL"/>
+          </a:p>
+        </p:txBody>
+      </p:sp>
+      <p:sp>
+        <p:nvSpPr>
+          <p:cNvPr id="4" name="Titel 3"/>
           <p:cNvSpPr>
             <a:spLocks noGrp="1"/>
           </p:cNvSpPr>
@@ -30915,14 +31366,224 @@
           <a:bodyPr/>
           <a:lstStyle/>
           <a:p>
-            <a:pPr algn="ctr"/>
-            <a:r>
-              <a:rPr lang="nl-NL" dirty="0"/>
-              <a:t/>
-            </a:r>
-            <a:br>
-              <a:rPr lang="nl-NL" dirty="0"/>
-            </a:br>
+            <a:r>
+              <a:rPr lang="nl-NL" dirty="0" smtClean="0"/>
+              <a:t>Architecture</a:t>
+            </a:r>
+            <a:endParaRPr lang="nl-NL" dirty="0"/>
+          </a:p>
+        </p:txBody>
+      </p:sp>
+      <p:sp>
+        <p:nvSpPr>
+          <p:cNvPr id="5" name="Tijdelijke aanduiding voor inhoud 4"/>
+          <p:cNvSpPr>
+            <a:spLocks noGrp="1"/>
+          </p:cNvSpPr>
+          <p:nvPr>
+            <p:ph idx="1"/>
+          </p:nvPr>
+        </p:nvSpPr>
+        <p:spPr/>
+        <p:txBody>
+          <a:bodyPr/>
+          <a:lstStyle/>
+          <a:p>
+            <a:pPr marL="0" indent="0">
+              <a:buNone/>
+            </a:pPr>
+            <a:r>
+              <a:rPr lang="nl-NL" dirty="0" smtClean="0"/>
+              <a:t>“Manages content </a:t>
+            </a:r>
+            <a:r>
+              <a:rPr lang="nl-NL" dirty="0" err="1" smtClean="0"/>
+              <a:t>replacement</a:t>
+            </a:r>
+            <a:r>
+              <a:rPr lang="nl-NL" dirty="0" smtClean="0"/>
+              <a:t>”</a:t>
+            </a:r>
+          </a:p>
+          <a:p>
+            <a:pPr marL="0" indent="0">
+              <a:buNone/>
+            </a:pPr>
+            <a:endParaRPr lang="nl-NL" dirty="0" smtClean="0"/>
+          </a:p>
+          <a:p>
+            <a:r>
+              <a:rPr lang="nl-NL" dirty="0" err="1" smtClean="0"/>
+              <a:t>Used</a:t>
+            </a:r>
+            <a:r>
+              <a:rPr lang="nl-NL" dirty="0" smtClean="0"/>
+              <a:t> </a:t>
+            </a:r>
+            <a:r>
+              <a:rPr lang="nl-NL" dirty="0" err="1" smtClean="0"/>
+              <a:t>by</a:t>
+            </a:r>
+            <a:r>
+              <a:rPr lang="nl-NL" dirty="0" smtClean="0"/>
+              <a:t> router </a:t>
+            </a:r>
+            <a:r>
+              <a:rPr lang="nl-NL" dirty="0" err="1" smtClean="0"/>
+              <a:t>for</a:t>
+            </a:r>
+            <a:r>
+              <a:rPr lang="nl-NL" dirty="0" smtClean="0"/>
+              <a:t> </a:t>
+            </a:r>
+            <a:r>
+              <a:rPr lang="nl-NL" dirty="0" err="1" smtClean="0"/>
+              <a:t>navigation</a:t>
+            </a:r>
+            <a:endParaRPr lang="nl-NL" dirty="0"/>
+          </a:p>
+        </p:txBody>
+      </p:sp>
+      <p:sp>
+        <p:nvSpPr>
+          <p:cNvPr id="6" name="Tijdelijke aanduiding voor tekst 5"/>
+          <p:cNvSpPr>
+            <a:spLocks noGrp="1"/>
+          </p:cNvSpPr>
+          <p:nvPr>
+            <p:ph type="body" idx="13"/>
+          </p:nvPr>
+        </p:nvSpPr>
+        <p:spPr/>
+        <p:txBody>
+          <a:bodyPr/>
+          <a:lstStyle/>
+          <a:p>
+            <a:r>
+              <a:rPr lang="nl-NL" dirty="0" err="1" smtClean="0"/>
+              <a:t>ojModule</a:t>
+            </a:r>
+            <a:endParaRPr lang="nl-NL" dirty="0"/>
+          </a:p>
+        </p:txBody>
+      </p:sp>
+      <p:sp>
+        <p:nvSpPr>
+          <p:cNvPr id="7" name="Tijdelijke aanduiding voor inhoud 6"/>
+          <p:cNvSpPr>
+            <a:spLocks noGrp="1"/>
+          </p:cNvSpPr>
+          <p:nvPr>
+            <p:ph idx="14"/>
+          </p:nvPr>
+        </p:nvSpPr>
+        <p:spPr/>
+        <p:txBody>
+          <a:bodyPr/>
+          <a:lstStyle/>
+          <a:p>
+            <a:pPr marL="0" indent="0">
+              <a:buNone/>
+            </a:pPr>
+            <a:r>
+              <a:rPr lang="nl-NL" dirty="0" smtClean="0"/>
+              <a:t>“</a:t>
+            </a:r>
+            <a:r>
+              <a:rPr lang="nl-NL" dirty="0" err="1" smtClean="0"/>
+              <a:t>Reusable</a:t>
+            </a:r>
+            <a:r>
+              <a:rPr lang="nl-NL" dirty="0" smtClean="0"/>
+              <a:t> piece of UI”</a:t>
+            </a:r>
+          </a:p>
+          <a:p>
+            <a:pPr marL="0" indent="0">
+              <a:buNone/>
+            </a:pPr>
+            <a:endParaRPr lang="nl-NL" dirty="0"/>
+          </a:p>
+          <a:p>
+            <a:r>
+              <a:rPr lang="nl-NL" dirty="0" smtClean="0"/>
+              <a:t>Has </a:t>
+            </a:r>
+            <a:r>
+              <a:rPr lang="nl-NL" dirty="0" err="1" smtClean="0"/>
+              <a:t>own</a:t>
+            </a:r>
+            <a:r>
+              <a:rPr lang="nl-NL" dirty="0" smtClean="0"/>
+              <a:t> html / JS / CSS</a:t>
+            </a:r>
+          </a:p>
+          <a:p>
+            <a:r>
+              <a:rPr lang="nl-NL" dirty="0" smtClean="0"/>
+              <a:t>Works on </a:t>
+            </a:r>
+            <a:r>
+              <a:rPr lang="nl-NL" dirty="0" err="1" smtClean="0"/>
+              <a:t>it’s</a:t>
+            </a:r>
+            <a:r>
+              <a:rPr lang="nl-NL" dirty="0" smtClean="0"/>
+              <a:t> </a:t>
+            </a:r>
+            <a:r>
+              <a:rPr lang="nl-NL" dirty="0" err="1" smtClean="0"/>
+              <a:t>own</a:t>
+            </a:r>
+            <a:r>
+              <a:rPr lang="nl-NL" dirty="0" smtClean="0"/>
+              <a:t> or </a:t>
+            </a:r>
+            <a:r>
+              <a:rPr lang="nl-NL" dirty="0" err="1" smtClean="0"/>
+              <a:t>with</a:t>
+            </a:r>
+            <a:r>
+              <a:rPr lang="nl-NL" dirty="0" smtClean="0"/>
+              <a:t> input </a:t>
+            </a:r>
+            <a:r>
+              <a:rPr lang="nl-NL" dirty="0" err="1" smtClean="0"/>
+              <a:t>from</a:t>
+            </a:r>
+            <a:r>
+              <a:rPr lang="nl-NL" dirty="0" smtClean="0"/>
+              <a:t> </a:t>
+            </a:r>
+            <a:r>
+              <a:rPr lang="nl-NL" dirty="0" err="1" smtClean="0"/>
+              <a:t>parent-application</a:t>
+            </a:r>
+            <a:endParaRPr lang="nl-NL" dirty="0" smtClean="0"/>
+          </a:p>
+          <a:p>
+            <a:pPr marL="0" indent="0">
+              <a:buNone/>
+            </a:pPr>
+            <a:endParaRPr lang="nl-NL" dirty="0"/>
+          </a:p>
+        </p:txBody>
+      </p:sp>
+      <p:sp>
+        <p:nvSpPr>
+          <p:cNvPr id="8" name="Tijdelijke aanduiding voor tekst 7"/>
+          <p:cNvSpPr>
+            <a:spLocks noGrp="1"/>
+          </p:cNvSpPr>
+          <p:nvPr>
+            <p:ph type="body" idx="15"/>
+          </p:nvPr>
+        </p:nvSpPr>
+        <p:spPr/>
+        <p:txBody>
+          <a:bodyPr/>
+          <a:lstStyle/>
+          <a:p>
             <a:r>
               <a:rPr lang="nl-NL" dirty="0" err="1" smtClean="0"/>
               <a:t>Composite</a:t>
@@ -30932,59 +31593,13 @@
               <a:t> Component</a:t>
             </a:r>
             <a:endParaRPr lang="nl-NL" dirty="0"/>
-          </a:p>
-        </p:txBody>
-      </p:sp>
-      <p:sp>
-        <p:nvSpPr>
-          <p:cNvPr id="3" name="Footer Placeholder 2"/>
-          <p:cNvSpPr>
-            <a:spLocks noGrp="1"/>
-          </p:cNvSpPr>
-          <p:nvPr>
-            <p:ph type="ftr" sz="quarter" idx="11"/>
-          </p:nvPr>
-        </p:nvSpPr>
-        <p:spPr/>
-        <p:txBody>
-          <a:bodyPr/>
-          <a:lstStyle/>
-          <a:p>
-            <a:r>
-              <a:rPr lang="fr-FR" noProof="0" smtClean="0"/>
-              <a:t>Oracle JET Talent Launch 2018</a:t>
-            </a:r>
-            <a:endParaRPr lang="nl-NL" noProof="0" dirty="0"/>
-          </a:p>
-        </p:txBody>
-      </p:sp>
-      <p:sp>
-        <p:nvSpPr>
-          <p:cNvPr id="5" name="Slide Number Placeholder 4"/>
-          <p:cNvSpPr>
-            <a:spLocks noGrp="1"/>
-          </p:cNvSpPr>
-          <p:nvPr>
-            <p:ph type="sldNum" sz="quarter" idx="12"/>
-          </p:nvPr>
-        </p:nvSpPr>
-        <p:spPr/>
-        <p:txBody>
-          <a:bodyPr/>
-          <a:lstStyle/>
-          <a:p>
-            <a:fld id="{14F1411D-0280-154F-AEAC-4C20B7AA46B2}" type="slidenum">
-              <a:rPr lang="nl-NL" noProof="0" smtClean="0"/>
-              <a:t>90</a:t>
-            </a:fld>
-            <a:endParaRPr lang="nl-NL" noProof="0" dirty="0"/>
           </a:p>
         </p:txBody>
       </p:sp>
     </p:spTree>
     <p:extLst>
       <p:ext uri="{BB962C8B-B14F-4D97-AF65-F5344CB8AC3E}">
-        <p14:creationId xmlns:p14="http://schemas.microsoft.com/office/powerpoint/2010/main" val="2595160496"/>
+        <p14:creationId xmlns:p14="http://schemas.microsoft.com/office/powerpoint/2010/main" val="931392004"/>
       </p:ext>
     </p:extLst>
   </p:cSld>
@@ -31013,7 +31628,7 @@
       </p:grpSpPr>
       <p:sp>
         <p:nvSpPr>
-          <p:cNvPr id="2" name="Title 1"/>
+          <p:cNvPr id="2" name="Titel 1"/>
           <p:cNvSpPr>
             <a:spLocks noGrp="1"/>
           </p:cNvSpPr>
@@ -31027,82 +31642,16 @@
           <a:lstStyle/>
           <a:p>
             <a:r>
-              <a:rPr lang="nl-NL" smtClean="0"/>
-              <a:t>Composite Components</a:t>
-            </a:r>
-            <a:endParaRPr lang="nl-NL"/>
-          </a:p>
-        </p:txBody>
-      </p:sp>
-      <p:sp>
-        <p:nvSpPr>
-          <p:cNvPr id="3" name="Content Placeholder 2"/>
-          <p:cNvSpPr>
-            <a:spLocks noGrp="1"/>
-          </p:cNvSpPr>
-          <p:nvPr>
-            <p:ph idx="1"/>
-          </p:nvPr>
-        </p:nvSpPr>
-        <p:spPr/>
-        <p:txBody>
-          <a:bodyPr/>
-          <a:lstStyle/>
-          <a:p>
-            <a:r>
-              <a:rPr lang="nl-NL" smtClean="0"/>
-              <a:t>What is it?</a:t>
-            </a:r>
-          </a:p>
-          <a:p>
-            <a:pPr lvl="1"/>
-            <a:r>
-              <a:rPr lang="nl-NL" smtClean="0"/>
-              <a:t>Encapsulated piece of functionality</a:t>
-            </a:r>
-          </a:p>
-          <a:p>
-            <a:pPr marL="180000" lvl="1" indent="0">
-              <a:buNone/>
-            </a:pPr>
-            <a:endParaRPr lang="nl-NL" smtClean="0"/>
-          </a:p>
-          <a:p>
-            <a:r>
-              <a:rPr lang="nl-NL" smtClean="0"/>
-              <a:t>Why use it?</a:t>
-            </a:r>
-          </a:p>
-          <a:p>
-            <a:pPr lvl="1"/>
-            <a:r>
-              <a:rPr lang="nl-NL" smtClean="0"/>
-              <a:t>Decreases size of files</a:t>
-            </a:r>
-          </a:p>
-          <a:p>
-            <a:pPr lvl="1"/>
-            <a:r>
-              <a:rPr lang="nl-NL" smtClean="0"/>
-              <a:t>Ready to distribute</a:t>
-            </a:r>
-          </a:p>
-          <a:p>
-            <a:pPr lvl="1"/>
-            <a:r>
-              <a:rPr lang="nl-NL" smtClean="0"/>
-              <a:t>Ready for re-use</a:t>
-            </a:r>
-          </a:p>
-          <a:p>
-            <a:pPr lvl="1"/>
-            <a:endParaRPr lang="nl-NL"/>
-          </a:p>
-        </p:txBody>
-      </p:sp>
-      <p:sp>
-        <p:nvSpPr>
-          <p:cNvPr id="4" name="Footer Placeholder 3"/>
+              <a:rPr lang="nl-NL" dirty="0" smtClean="0"/>
+              <a:t>Architecture</a:t>
+            </a:r>
+            <a:endParaRPr lang="nl-NL" dirty="0"/>
+          </a:p>
+        </p:txBody>
+      </p:sp>
+      <p:sp>
+        <p:nvSpPr>
+          <p:cNvPr id="4" name="Tijdelijke aanduiding voor voettekst 3"/>
           <p:cNvSpPr>
             <a:spLocks noGrp="1"/>
           </p:cNvSpPr>
@@ -31119,13 +31668,13 @@
               <a:rPr lang="fr-FR" smtClean="0"/>
               <a:t>Oracle JET Talent Launch 2018</a:t>
             </a:r>
-            <a:endParaRPr lang="nl-NL" dirty="0"/>
-          </a:p>
-        </p:txBody>
-      </p:sp>
-      <p:sp>
-        <p:nvSpPr>
-          <p:cNvPr id="6" name="Slide Number Placeholder 5"/>
+            <a:endParaRPr lang="nl-NL"/>
+          </a:p>
+        </p:txBody>
+      </p:sp>
+      <p:sp>
+        <p:nvSpPr>
+          <p:cNvPr id="5" name="Tijdelijke aanduiding voor dianummer 4"/>
           <p:cNvSpPr>
             <a:spLocks noGrp="1"/>
           </p:cNvSpPr>
@@ -31146,10 +31695,249 @@
           </a:p>
         </p:txBody>
       </p:sp>
+      <p:sp>
+        <p:nvSpPr>
+          <p:cNvPr id="6" name="Tijdelijke aanduiding voor tekst 5"/>
+          <p:cNvSpPr>
+            <a:spLocks noGrp="1"/>
+          </p:cNvSpPr>
+          <p:nvPr>
+            <p:ph type="body" idx="13"/>
+          </p:nvPr>
+        </p:nvSpPr>
+        <p:spPr/>
+        <p:txBody>
+          <a:bodyPr/>
+          <a:lstStyle/>
+          <a:p>
+            <a:r>
+              <a:rPr lang="nl-NL" dirty="0" smtClean="0"/>
+              <a:t>Clean codebase</a:t>
+            </a:r>
+            <a:endParaRPr lang="nl-NL" dirty="0"/>
+          </a:p>
+        </p:txBody>
+      </p:sp>
+      <p:pic>
+        <p:nvPicPr>
+          <p:cNvPr id="12" name="Afbeelding 11"/>
+          <p:cNvPicPr>
+            <a:picLocks noChangeAspect="1"/>
+          </p:cNvPicPr>
+          <p:nvPr/>
+        </p:nvPicPr>
+        <p:blipFill>
+          <a:blip r:embed="rId3"/>
+          <a:stretch>
+            <a:fillRect/>
+          </a:stretch>
+        </p:blipFill>
+        <p:spPr>
+          <a:xfrm>
+            <a:off x="4075345" y="1845876"/>
+            <a:ext cx="1005927" cy="1531753"/>
+          </a:xfrm>
+          <a:prstGeom prst="rect">
+            <a:avLst/>
+          </a:prstGeom>
+          <a:ln w="19050">
+            <a:solidFill>
+              <a:schemeClr val="tx2"/>
+            </a:solidFill>
+          </a:ln>
+        </p:spPr>
+      </p:pic>
+      <p:pic>
+        <p:nvPicPr>
+          <p:cNvPr id="13" name="Afbeelding 12"/>
+          <p:cNvPicPr>
+            <a:picLocks noChangeAspect="1"/>
+          </p:cNvPicPr>
+          <p:nvPr/>
+        </p:nvPicPr>
+        <p:blipFill>
+          <a:blip r:embed="rId4"/>
+          <a:stretch>
+            <a:fillRect/>
+          </a:stretch>
+        </p:blipFill>
+        <p:spPr>
+          <a:xfrm>
+            <a:off x="7148728" y="792000"/>
+            <a:ext cx="1059272" cy="2187130"/>
+          </a:xfrm>
+          <a:prstGeom prst="rect">
+            <a:avLst/>
+          </a:prstGeom>
+        </p:spPr>
+      </p:pic>
+      <p:pic>
+        <p:nvPicPr>
+          <p:cNvPr id="14" name="Afbeelding 13"/>
+          <p:cNvPicPr>
+            <a:picLocks noChangeAspect="1"/>
+          </p:cNvPicPr>
+          <p:nvPr/>
+        </p:nvPicPr>
+        <p:blipFill>
+          <a:blip r:embed="rId5"/>
+          <a:stretch>
+            <a:fillRect/>
+          </a:stretch>
+        </p:blipFill>
+        <p:spPr>
+          <a:xfrm>
+            <a:off x="719998" y="1368000"/>
+            <a:ext cx="1287892" cy="1524132"/>
+          </a:xfrm>
+          <a:prstGeom prst="rect">
+            <a:avLst/>
+          </a:prstGeom>
+        </p:spPr>
+      </p:pic>
+      <p:cxnSp>
+        <p:nvCxnSpPr>
+          <p:cNvPr id="16" name="Rechte verbindingslijn met pijl 15"/>
+          <p:cNvCxnSpPr>
+            <a:stCxn id="12" idx="3"/>
+            <a:endCxn id="13" idx="1"/>
+          </p:cNvCxnSpPr>
+          <p:nvPr/>
+        </p:nvCxnSpPr>
+        <p:spPr>
+          <a:xfrm flipV="1">
+            <a:off x="5081272" y="1885565"/>
+            <a:ext cx="2067456" cy="726188"/>
+          </a:xfrm>
+          <a:prstGeom prst="straightConnector1">
+            <a:avLst/>
+          </a:prstGeom>
+          <a:ln w="19050">
+            <a:solidFill>
+              <a:schemeClr val="tx2"/>
+            </a:solidFill>
+            <a:tailEnd type="triangle"/>
+          </a:ln>
+        </p:spPr>
+        <p:style>
+          <a:lnRef idx="1">
+            <a:schemeClr val="accent1"/>
+          </a:lnRef>
+          <a:fillRef idx="0">
+            <a:schemeClr val="accent1"/>
+          </a:fillRef>
+          <a:effectRef idx="0">
+            <a:schemeClr val="accent1"/>
+          </a:effectRef>
+          <a:fontRef idx="minor">
+            <a:schemeClr val="tx1"/>
+          </a:fontRef>
+        </p:style>
+      </p:cxnSp>
+      <p:cxnSp>
+        <p:nvCxnSpPr>
+          <p:cNvPr id="18" name="Rechte verbindingslijn met pijl 17"/>
+          <p:cNvCxnSpPr>
+            <a:endCxn id="14" idx="3"/>
+          </p:cNvCxnSpPr>
+          <p:nvPr/>
+        </p:nvCxnSpPr>
+        <p:spPr>
+          <a:xfrm flipH="1" flipV="1">
+            <a:off x="2007890" y="2130066"/>
+            <a:ext cx="2281238" cy="639448"/>
+          </a:xfrm>
+          <a:prstGeom prst="straightConnector1">
+            <a:avLst/>
+          </a:prstGeom>
+          <a:ln w="19050">
+            <a:solidFill>
+              <a:schemeClr val="tx2"/>
+            </a:solidFill>
+            <a:tailEnd type="triangle"/>
+          </a:ln>
+        </p:spPr>
+        <p:style>
+          <a:lnRef idx="1">
+            <a:schemeClr val="accent1"/>
+          </a:lnRef>
+          <a:fillRef idx="0">
+            <a:schemeClr val="accent1"/>
+          </a:fillRef>
+          <a:effectRef idx="0">
+            <a:schemeClr val="accent1"/>
+          </a:effectRef>
+          <a:fontRef idx="minor">
+            <a:schemeClr val="tx1"/>
+          </a:fontRef>
+        </p:style>
+      </p:cxnSp>
+      <p:pic>
+        <p:nvPicPr>
+          <p:cNvPr id="26" name="Afbeelding 25"/>
+          <p:cNvPicPr>
+            <a:picLocks noChangeAspect="1"/>
+          </p:cNvPicPr>
+          <p:nvPr/>
+        </p:nvPicPr>
+        <p:blipFill>
+          <a:blip r:embed="rId6"/>
+          <a:stretch>
+            <a:fillRect/>
+          </a:stretch>
+        </p:blipFill>
+        <p:spPr>
+          <a:xfrm>
+            <a:off x="5608226" y="2979130"/>
+            <a:ext cx="1013548" cy="1828958"/>
+          </a:xfrm>
+          <a:prstGeom prst="rect">
+            <a:avLst/>
+          </a:prstGeom>
+        </p:spPr>
+      </p:pic>
+      <p:cxnSp>
+        <p:nvCxnSpPr>
+          <p:cNvPr id="27" name="Rechte verbindingslijn met pijl 26"/>
+          <p:cNvCxnSpPr>
+            <a:endCxn id="26" idx="1"/>
+          </p:cNvCxnSpPr>
+          <p:nvPr/>
+        </p:nvCxnSpPr>
+        <p:spPr>
+          <a:xfrm>
+            <a:off x="4762774" y="3248870"/>
+            <a:ext cx="845452" cy="644739"/>
+          </a:xfrm>
+          <a:prstGeom prst="straightConnector1">
+            <a:avLst/>
+          </a:prstGeom>
+          <a:ln w="19050">
+            <a:solidFill>
+              <a:schemeClr val="tx2"/>
+            </a:solidFill>
+            <a:tailEnd type="triangle"/>
+          </a:ln>
+        </p:spPr>
+        <p:style>
+          <a:lnRef idx="1">
+            <a:schemeClr val="accent1"/>
+          </a:lnRef>
+          <a:fillRef idx="0">
+            <a:schemeClr val="accent1"/>
+          </a:fillRef>
+          <a:effectRef idx="0">
+            <a:schemeClr val="accent1"/>
+          </a:effectRef>
+          <a:fontRef idx="minor">
+            <a:schemeClr val="tx1"/>
+          </a:fontRef>
+        </p:style>
+      </p:cxnSp>
     </p:spTree>
     <p:extLst>
       <p:ext uri="{BB962C8B-B14F-4D97-AF65-F5344CB8AC3E}">
-        <p14:creationId xmlns:p14="http://schemas.microsoft.com/office/powerpoint/2010/main" val="2817273278"/>
+        <p14:creationId xmlns:p14="http://schemas.microsoft.com/office/powerpoint/2010/main" val="255265042"/>
       </p:ext>
     </p:extLst>
   </p:cSld>
@@ -31191,67 +31979,29 @@
           <a:bodyPr/>
           <a:lstStyle/>
           <a:p>
-            <a:r>
-              <a:rPr lang="nl-NL" smtClean="0"/>
-              <a:t>Structure</a:t>
-            </a:r>
-            <a:endParaRPr lang="nl-NL"/>
-          </a:p>
-        </p:txBody>
-      </p:sp>
-      <p:sp>
-        <p:nvSpPr>
-          <p:cNvPr id="3" name="Content Placeholder 2"/>
-          <p:cNvSpPr>
-            <a:spLocks noGrp="1"/>
-          </p:cNvSpPr>
-          <p:nvPr>
-            <p:ph idx="1"/>
-          </p:nvPr>
-        </p:nvSpPr>
-        <p:spPr/>
-        <p:txBody>
-          <a:bodyPr/>
-          <a:lstStyle/>
-          <a:p>
-            <a:r>
-              <a:rPr lang="nl-NL" smtClean="0"/>
-              <a:t>HTML file (view)</a:t>
-            </a:r>
-          </a:p>
-          <a:p>
-            <a:r>
-              <a:rPr lang="nl-NL" smtClean="0"/>
-              <a:t>JavaScript file (viewModel)</a:t>
-            </a:r>
-          </a:p>
-          <a:p>
-            <a:r>
-              <a:rPr lang="nl-NL" smtClean="0"/>
-              <a:t>Loader file (starting point)</a:t>
-            </a:r>
-          </a:p>
-          <a:p>
-            <a:r>
-              <a:rPr lang="nl-NL" smtClean="0"/>
-              <a:t>JSON configuration file (parameters)</a:t>
-            </a:r>
-          </a:p>
-          <a:p>
-            <a:r>
-              <a:rPr lang="nl-NL" smtClean="0"/>
-              <a:t>CSS file (styling)</a:t>
-            </a:r>
-            <a:endParaRPr lang="nl-NL"/>
-          </a:p>
-          <a:p>
-            <a:endParaRPr lang="nl-NL"/>
-          </a:p>
-        </p:txBody>
-      </p:sp>
-      <p:sp>
-        <p:nvSpPr>
-          <p:cNvPr id="4" name="Footer Placeholder 3"/>
+            <a:pPr algn="ctr"/>
+            <a:r>
+              <a:rPr lang="nl-NL" dirty="0"/>
+              <a:t/>
+            </a:r>
+            <a:br>
+              <a:rPr lang="nl-NL" dirty="0"/>
+            </a:br>
+            <a:r>
+              <a:rPr lang="nl-NL" dirty="0" err="1" smtClean="0"/>
+              <a:t>Composite</a:t>
+            </a:r>
+            <a:r>
+              <a:rPr lang="nl-NL" dirty="0" smtClean="0"/>
+              <a:t> Component</a:t>
+            </a:r>
+            <a:endParaRPr lang="nl-NL" dirty="0"/>
+          </a:p>
+        </p:txBody>
+      </p:sp>
+      <p:sp>
+        <p:nvSpPr>
+          <p:cNvPr id="3" name="Footer Placeholder 2"/>
           <p:cNvSpPr>
             <a:spLocks noGrp="1"/>
           </p:cNvSpPr>
@@ -31265,16 +32015,16 @@
           <a:lstStyle/>
           <a:p>
             <a:r>
-              <a:rPr lang="fr-FR" smtClean="0"/>
+              <a:rPr lang="fr-FR" noProof="0" smtClean="0"/>
               <a:t>Oracle JET Talent Launch 2018</a:t>
             </a:r>
-            <a:endParaRPr lang="nl-NL" dirty="0"/>
-          </a:p>
-        </p:txBody>
-      </p:sp>
-      <p:sp>
-        <p:nvSpPr>
-          <p:cNvPr id="6" name="Slide Number Placeholder 5"/>
+            <a:endParaRPr lang="nl-NL" noProof="0" dirty="0"/>
+          </a:p>
+        </p:txBody>
+      </p:sp>
+      <p:sp>
+        <p:nvSpPr>
+          <p:cNvPr id="5" name="Slide Number Placeholder 4"/>
           <p:cNvSpPr>
             <a:spLocks noGrp="1"/>
           </p:cNvSpPr>
@@ -31288,17 +32038,17 @@
           <a:lstStyle/>
           <a:p>
             <a:fld id="{14F1411D-0280-154F-AEAC-4C20B7AA46B2}" type="slidenum">
-              <a:rPr lang="nl-NL" smtClean="0"/>
+              <a:rPr lang="nl-NL" noProof="0" smtClean="0"/>
               <a:t>92</a:t>
             </a:fld>
-            <a:endParaRPr lang="nl-NL"/>
+            <a:endParaRPr lang="nl-NL" noProof="0" dirty="0"/>
           </a:p>
         </p:txBody>
       </p:sp>
     </p:spTree>
     <p:extLst>
       <p:ext uri="{BB962C8B-B14F-4D97-AF65-F5344CB8AC3E}">
-        <p14:creationId xmlns:p14="http://schemas.microsoft.com/office/powerpoint/2010/main" val="1937970284"/>
+        <p14:creationId xmlns:p14="http://schemas.microsoft.com/office/powerpoint/2010/main" val="2595160496"/>
       </p:ext>
     </p:extLst>
   </p:cSld>
@@ -31342,7 +32092,7 @@
           <a:p>
             <a:r>
               <a:rPr lang="nl-NL" smtClean="0"/>
-              <a:t>Creating your component</a:t>
+              <a:t>Composite Components</a:t>
             </a:r>
             <a:endParaRPr lang="nl-NL"/>
           </a:p>
@@ -31364,29 +32114,52 @@
           <a:lstStyle/>
           <a:p>
             <a:r>
-              <a:rPr lang="nl-NL"/>
-              <a:t>o</a:t>
-            </a:r>
-            <a:r>
-              <a:rPr lang="nl-NL" smtClean="0"/>
-              <a:t>jet create component &lt;component-name&gt;</a:t>
-            </a:r>
-            <a:endParaRPr lang="nl-NL"/>
-          </a:p>
-          <a:p>
-            <a:r>
-              <a:rPr lang="nl-NL"/>
-              <a:t>ojet create component </a:t>
-            </a:r>
-            <a:r>
-              <a:rPr lang="nl-NL" smtClean="0"/>
-              <a:t>first-component</a:t>
-            </a:r>
-          </a:p>
-          <a:p>
-            <a:endParaRPr lang="nl-NL"/>
-          </a:p>
-          <a:p>
+              <a:rPr lang="nl-NL" smtClean="0"/>
+              <a:t>What is it?</a:t>
+            </a:r>
+          </a:p>
+          <a:p>
+            <a:pPr lvl="1"/>
+            <a:r>
+              <a:rPr lang="nl-NL" smtClean="0"/>
+              <a:t>Encapsulated piece of functionality</a:t>
+            </a:r>
+          </a:p>
+          <a:p>
+            <a:pPr marL="180000" lvl="1" indent="0">
+              <a:buNone/>
+            </a:pPr>
+            <a:endParaRPr lang="nl-NL" smtClean="0"/>
+          </a:p>
+          <a:p>
+            <a:r>
+              <a:rPr lang="nl-NL" smtClean="0"/>
+              <a:t>Why use it?</a:t>
+            </a:r>
+          </a:p>
+          <a:p>
+            <a:pPr lvl="1"/>
+            <a:r>
+              <a:rPr lang="nl-NL" smtClean="0"/>
+              <a:t>Decreases size of files</a:t>
+            </a:r>
+          </a:p>
+          <a:p>
+            <a:pPr lvl="1"/>
+            <a:r>
+              <a:rPr lang="nl-NL" smtClean="0"/>
+              <a:t>Ready to distribute</a:t>
+            </a:r>
+          </a:p>
+          <a:p>
+            <a:pPr lvl="1"/>
+            <a:r>
+              <a:rPr lang="nl-NL" smtClean="0"/>
+              <a:t>Ready for re-use</a:t>
+            </a:r>
+          </a:p>
+          <a:p>
+            <a:pPr lvl="1"/>
             <a:endParaRPr lang="nl-NL"/>
           </a:p>
         </p:txBody>
@@ -31414,33 +32187,9 @@
           </a:p>
         </p:txBody>
       </p:sp>
-      <p:pic>
-        <p:nvPicPr>
-          <p:cNvPr id="6" name="Picture 5"/>
-          <p:cNvPicPr>
-            <a:picLocks noChangeAspect="1"/>
-          </p:cNvPicPr>
-          <p:nvPr/>
-        </p:nvPicPr>
-        <p:blipFill>
-          <a:blip r:embed="rId2"/>
-          <a:stretch>
-            <a:fillRect/>
-          </a:stretch>
-        </p:blipFill>
-        <p:spPr>
-          <a:xfrm>
-            <a:off x="865830" y="1589469"/>
-            <a:ext cx="2654311" cy="1516750"/>
-          </a:xfrm>
-          <a:prstGeom prst="rect">
-            <a:avLst/>
-          </a:prstGeom>
-        </p:spPr>
-      </p:pic>
-      <p:sp>
-        <p:nvSpPr>
-          <p:cNvPr id="7" name="Slide Number Placeholder 6"/>
+      <p:sp>
+        <p:nvSpPr>
+          <p:cNvPr id="6" name="Slide Number Placeholder 5"/>
           <p:cNvSpPr>
             <a:spLocks noGrp="1"/>
           </p:cNvSpPr>
@@ -31464,7 +32213,7 @@
     </p:spTree>
     <p:extLst>
       <p:ext uri="{BB962C8B-B14F-4D97-AF65-F5344CB8AC3E}">
-        <p14:creationId xmlns:p14="http://schemas.microsoft.com/office/powerpoint/2010/main" val="1137198993"/>
+        <p14:creationId xmlns:p14="http://schemas.microsoft.com/office/powerpoint/2010/main" val="2817273278"/>
       </p:ext>
     </p:extLst>
   </p:cSld>
@@ -31508,7 +32257,7 @@
           <a:p>
             <a:r>
               <a:rPr lang="nl-NL" smtClean="0"/>
-              <a:t>Loader.js</a:t>
+              <a:t>Structure</a:t>
             </a:r>
             <a:endParaRPr lang="nl-NL"/>
           </a:p>
@@ -31529,9 +32278,34 @@
           <a:bodyPr/>
           <a:lstStyle/>
           <a:p>
-            <a:pPr marL="0" indent="0">
-              <a:buNone/>
-            </a:pPr>
+            <a:r>
+              <a:rPr lang="nl-NL" smtClean="0"/>
+              <a:t>HTML file (view)</a:t>
+            </a:r>
+          </a:p>
+          <a:p>
+            <a:r>
+              <a:rPr lang="nl-NL" smtClean="0"/>
+              <a:t>JavaScript file (viewModel)</a:t>
+            </a:r>
+          </a:p>
+          <a:p>
+            <a:r>
+              <a:rPr lang="nl-NL" smtClean="0"/>
+              <a:t>Loader file (starting point)</a:t>
+            </a:r>
+          </a:p>
+          <a:p>
+            <a:r>
+              <a:rPr lang="nl-NL" smtClean="0"/>
+              <a:t>JSON configuration file (parameters)</a:t>
+            </a:r>
+          </a:p>
+          <a:p>
+            <a:r>
+              <a:rPr lang="nl-NL" smtClean="0"/>
+              <a:t>CSS file (styling)</a:t>
+            </a:r>
             <a:endParaRPr lang="nl-NL"/>
           </a:p>
           <a:p>
@@ -31562,30 +32336,6 @@
           </a:p>
         </p:txBody>
       </p:sp>
-      <p:pic>
-        <p:nvPicPr>
-          <p:cNvPr id="7" name="Picture 6"/>
-          <p:cNvPicPr>
-            <a:picLocks noChangeAspect="1"/>
-          </p:cNvPicPr>
-          <p:nvPr/>
-        </p:nvPicPr>
-        <p:blipFill>
-          <a:blip r:embed="rId2"/>
-          <a:stretch>
-            <a:fillRect/>
-          </a:stretch>
-        </p:blipFill>
-        <p:spPr>
-          <a:xfrm>
-            <a:off x="417357" y="1186095"/>
-            <a:ext cx="7460627" cy="1958510"/>
-          </a:xfrm>
-          <a:prstGeom prst="rect">
-            <a:avLst/>
-          </a:prstGeom>
-        </p:spPr>
-      </p:pic>
       <p:sp>
         <p:nvSpPr>
           <p:cNvPr id="6" name="Slide Number Placeholder 5"/>
@@ -31612,7 +32362,7 @@
     </p:spTree>
     <p:extLst>
       <p:ext uri="{BB962C8B-B14F-4D97-AF65-F5344CB8AC3E}">
-        <p14:creationId xmlns:p14="http://schemas.microsoft.com/office/powerpoint/2010/main" val="1090916447"/>
+        <p14:creationId xmlns:p14="http://schemas.microsoft.com/office/powerpoint/2010/main" val="1937970284"/>
       </p:ext>
     </p:extLst>
   </p:cSld>
@@ -31656,7 +32406,7 @@
           <a:p>
             <a:r>
               <a:rPr lang="nl-NL" smtClean="0"/>
-              <a:t>Component.json</a:t>
+              <a:t>Creating your component</a:t>
             </a:r>
             <a:endParaRPr lang="nl-NL"/>
           </a:p>
@@ -31677,9 +32427,27 @@
           <a:bodyPr/>
           <a:lstStyle/>
           <a:p>
-            <a:pPr marL="0" indent="0">
-              <a:buNone/>
-            </a:pPr>
+            <a:r>
+              <a:rPr lang="nl-NL"/>
+              <a:t>o</a:t>
+            </a:r>
+            <a:r>
+              <a:rPr lang="nl-NL" smtClean="0"/>
+              <a:t>jet create component &lt;component-name&gt;</a:t>
+            </a:r>
+            <a:endParaRPr lang="nl-NL"/>
+          </a:p>
+          <a:p>
+            <a:r>
+              <a:rPr lang="nl-NL"/>
+              <a:t>ojet create component </a:t>
+            </a:r>
+            <a:r>
+              <a:rPr lang="nl-NL" smtClean="0"/>
+              <a:t>first-component</a:t>
+            </a:r>
+          </a:p>
+          <a:p>
             <a:endParaRPr lang="nl-NL"/>
           </a:p>
           <a:p>
@@ -31712,7 +32480,7 @@
       </p:sp>
       <p:pic>
         <p:nvPicPr>
-          <p:cNvPr id="8" name="Picture 7"/>
+          <p:cNvPr id="6" name="Picture 5"/>
           <p:cNvPicPr>
             <a:picLocks noChangeAspect="1"/>
           </p:cNvPicPr>
@@ -31726,8 +32494,8 @@
         </p:blipFill>
         <p:spPr>
           <a:xfrm>
-            <a:off x="2735421" y="1268617"/>
-            <a:ext cx="3673158" cy="2606266"/>
+            <a:off x="865830" y="1589469"/>
+            <a:ext cx="2654311" cy="1516750"/>
           </a:xfrm>
           <a:prstGeom prst="rect">
             <a:avLst/>
@@ -31736,7 +32504,7 @@
       </p:pic>
       <p:sp>
         <p:nvSpPr>
-          <p:cNvPr id="6" name="Slide Number Placeholder 5"/>
+          <p:cNvPr id="7" name="Slide Number Placeholder 6"/>
           <p:cNvSpPr>
             <a:spLocks noGrp="1"/>
           </p:cNvSpPr>
@@ -31760,7 +32528,7 @@
     </p:spTree>
     <p:extLst>
       <p:ext uri="{BB962C8B-B14F-4D97-AF65-F5344CB8AC3E}">
-        <p14:creationId xmlns:p14="http://schemas.microsoft.com/office/powerpoint/2010/main" val="2947541101"/>
+        <p14:creationId xmlns:p14="http://schemas.microsoft.com/office/powerpoint/2010/main" val="1137198993"/>
       </p:ext>
     </p:extLst>
   </p:cSld>
@@ -31804,7 +32572,7 @@
           <a:p>
             <a:r>
               <a:rPr lang="nl-NL" smtClean="0"/>
-              <a:t>Example</a:t>
+              <a:t>Loader.js</a:t>
             </a:r>
             <a:endParaRPr lang="nl-NL"/>
           </a:p>
@@ -31860,7 +32628,7 @@
       </p:sp>
       <p:pic>
         <p:nvPicPr>
-          <p:cNvPr id="6" name="Picture 5"/>
+          <p:cNvPr id="7" name="Picture 6"/>
           <p:cNvPicPr>
             <a:picLocks noChangeAspect="1"/>
           </p:cNvPicPr>
@@ -31874,8 +32642,8 @@
         </p:blipFill>
         <p:spPr>
           <a:xfrm>
-            <a:off x="2144350" y="348395"/>
-            <a:ext cx="5357324" cy="4183743"/>
+            <a:off x="417357" y="1186095"/>
+            <a:ext cx="7460627" cy="1958510"/>
           </a:xfrm>
           <a:prstGeom prst="rect">
             <a:avLst/>
@@ -31884,7 +32652,7 @@
       </p:pic>
       <p:sp>
         <p:nvSpPr>
-          <p:cNvPr id="7" name="Slide Number Placeholder 6"/>
+          <p:cNvPr id="6" name="Slide Number Placeholder 5"/>
           <p:cNvSpPr>
             <a:spLocks noGrp="1"/>
           </p:cNvSpPr>
@@ -31908,7 +32676,7 @@
     </p:spTree>
     <p:extLst>
       <p:ext uri="{BB962C8B-B14F-4D97-AF65-F5344CB8AC3E}">
-        <p14:creationId xmlns:p14="http://schemas.microsoft.com/office/powerpoint/2010/main" val="3909449683"/>
+        <p14:creationId xmlns:p14="http://schemas.microsoft.com/office/powerpoint/2010/main" val="1090916447"/>
       </p:ext>
     </p:extLst>
   </p:cSld>
@@ -31952,7 +32720,7 @@
           <a:p>
             <a:r>
               <a:rPr lang="nl-NL" smtClean="0"/>
-              <a:t>Example</a:t>
+              <a:t>Component.json</a:t>
             </a:r>
             <a:endParaRPr lang="nl-NL"/>
           </a:p>
@@ -32008,7 +32776,7 @@
       </p:sp>
       <p:pic>
         <p:nvPicPr>
-          <p:cNvPr id="7" name="Picture 6"/>
+          <p:cNvPr id="8" name="Picture 7"/>
           <p:cNvPicPr>
             <a:picLocks noChangeAspect="1"/>
           </p:cNvPicPr>
@@ -32022,8 +32790,8 @@
         </p:blipFill>
         <p:spPr>
           <a:xfrm>
-            <a:off x="1485632" y="1123824"/>
-            <a:ext cx="6172735" cy="2895851"/>
+            <a:off x="2735421" y="1268617"/>
+            <a:ext cx="3673158" cy="2606266"/>
           </a:xfrm>
           <a:prstGeom prst="rect">
             <a:avLst/>
@@ -32056,7 +32824,7 @@
     </p:spTree>
     <p:extLst>
       <p:ext uri="{BB962C8B-B14F-4D97-AF65-F5344CB8AC3E}">
-        <p14:creationId xmlns:p14="http://schemas.microsoft.com/office/powerpoint/2010/main" val="1257253234"/>
+        <p14:creationId xmlns:p14="http://schemas.microsoft.com/office/powerpoint/2010/main" val="2947541101"/>
       </p:ext>
     </p:extLst>
   </p:cSld>
@@ -32121,47 +32889,9 @@
           <a:bodyPr/>
           <a:lstStyle/>
           <a:p>
-            <a:endParaRPr lang="en-US" smtClean="0"/>
-          </a:p>
-          <a:p>
-            <a:endParaRPr lang="en-US"/>
-          </a:p>
-          <a:p>
-            <a:endParaRPr lang="en-US" smtClean="0"/>
-          </a:p>
-          <a:p>
-            <a:endParaRPr lang="en-US"/>
-          </a:p>
-          <a:p>
-            <a:endParaRPr lang="en-US" smtClean="0"/>
-          </a:p>
-          <a:p>
-            <a:endParaRPr lang="en-US"/>
-          </a:p>
-          <a:p>
-            <a:endParaRPr lang="en-US" smtClean="0"/>
-          </a:p>
-          <a:p>
-            <a:endParaRPr lang="en-US"/>
-          </a:p>
-          <a:p>
-            <a:endParaRPr lang="en-US" smtClean="0"/>
-          </a:p>
-          <a:p>
-            <a:endParaRPr lang="en-US"/>
-          </a:p>
-          <a:p>
-            <a:endParaRPr lang="en-US" smtClean="0"/>
-          </a:p>
-          <a:p>
-            <a:r>
-              <a:rPr lang="en-US" smtClean="0"/>
-              <a:t>Camel-case </a:t>
-            </a:r>
-            <a:r>
-              <a:rPr lang="en-US"/>
-              <a:t>property names are converted into case-insensitive HTML element attributes with hyphens at the camel-case break point of the original name. </a:t>
-            </a:r>
+            <a:pPr marL="0" indent="0">
+              <a:buNone/>
+            </a:pPr>
             <a:endParaRPr lang="nl-NL"/>
           </a:p>
           <a:p>
@@ -32208,68 +32938,14 @@
         </p:blipFill>
         <p:spPr>
           <a:xfrm>
-            <a:off x="483544" y="732800"/>
-            <a:ext cx="4100410" cy="1932130"/>
+            <a:off x="2144350" y="348395"/>
+            <a:ext cx="5357324" cy="4183743"/>
           </a:xfrm>
           <a:prstGeom prst="rect">
             <a:avLst/>
           </a:prstGeom>
         </p:spPr>
       </p:pic>
-      <p:pic>
-        <p:nvPicPr>
-          <p:cNvPr id="8" name="Picture 7"/>
-          <p:cNvPicPr>
-            <a:picLocks noChangeAspect="1"/>
-          </p:cNvPicPr>
-          <p:nvPr/>
-        </p:nvPicPr>
-        <p:blipFill>
-          <a:blip r:embed="rId3"/>
-          <a:stretch>
-            <a:fillRect/>
-          </a:stretch>
-        </p:blipFill>
-        <p:spPr>
-          <a:xfrm>
-            <a:off x="4968000" y="2009553"/>
-            <a:ext cx="3002540" cy="1310754"/>
-          </a:xfrm>
-          <a:prstGeom prst="rect">
-            <a:avLst/>
-          </a:prstGeom>
-          <a:solidFill>
-            <a:srgbClr val="FFFFFF">
-              <a:shade val="85000"/>
-            </a:srgbClr>
-          </a:solidFill>
-          <a:ln w="88900" cap="sq">
-            <a:solidFill>
-              <a:srgbClr val="FFFFFF"/>
-            </a:solidFill>
-            <a:miter lim="800000"/>
-          </a:ln>
-          <a:effectLst>
-            <a:outerShdw blurRad="55000" dist="18000" dir="5400000" algn="tl" rotWithShape="0">
-              <a:srgbClr val="000000">
-                <a:alpha val="40000"/>
-              </a:srgbClr>
-            </a:outerShdw>
-          </a:effectLst>
-          <a:scene3d>
-            <a:camera prst="orthographicFront"/>
-            <a:lightRig rig="twoPt" dir="t">
-              <a:rot lat="0" lon="0" rev="7200000"/>
-            </a:lightRig>
-          </a:scene3d>
-          <a:sp3d>
-            <a:bevelT w="25400" h="19050"/>
-            <a:contourClr>
-              <a:srgbClr val="FFFFFF"/>
-            </a:contourClr>
-          </a:sp3d>
-        </p:spPr>
-      </p:pic>
       <p:sp>
         <p:nvSpPr>
           <p:cNvPr id="7" name="Slide Number Placeholder 6"/>
@@ -32296,7 +32972,7 @@
     </p:spTree>
     <p:extLst>
       <p:ext uri="{BB962C8B-B14F-4D97-AF65-F5344CB8AC3E}">
-        <p14:creationId xmlns:p14="http://schemas.microsoft.com/office/powerpoint/2010/main" val="189595874"/>
+        <p14:creationId xmlns:p14="http://schemas.microsoft.com/office/powerpoint/2010/main" val="3909449683"/>
       </p:ext>
     </p:extLst>
   </p:cSld>
@@ -32325,7 +33001,7 @@
       </p:grpSpPr>
       <p:sp>
         <p:nvSpPr>
-          <p:cNvPr id="2" name="Titel 1"/>
+          <p:cNvPr id="2" name="Title 1"/>
           <p:cNvSpPr>
             <a:spLocks noGrp="1"/>
           </p:cNvSpPr>
@@ -32338,22 +33014,17 @@
           <a:bodyPr/>
           <a:lstStyle/>
           <a:p>
-            <a:pPr algn="ctr"/>
-            <a:r>
-              <a:rPr lang="nl-NL" smtClean="0"/>
-              <a:t>Assignment - Composite </a:t>
-            </a:r>
-            <a:r>
-              <a:rPr lang="nl-NL" dirty="0" smtClean="0"/>
-              <a:t>Component</a:t>
-            </a:r>
-            <a:endParaRPr lang="nl-NL" dirty="0"/>
-          </a:p>
-        </p:txBody>
-      </p:sp>
-      <p:sp>
-        <p:nvSpPr>
-          <p:cNvPr id="3" name="Tijdelijke aanduiding voor inhoud 2"/>
+            <a:r>
+              <a:rPr lang="nl-NL" smtClean="0"/>
+              <a:t>Example</a:t>
+            </a:r>
+            <a:endParaRPr lang="nl-NL"/>
+          </a:p>
+        </p:txBody>
+      </p:sp>
+      <p:sp>
+        <p:nvSpPr>
+          <p:cNvPr id="3" name="Content Placeholder 2"/>
           <p:cNvSpPr>
             <a:spLocks noGrp="1"/>
           </p:cNvSpPr>
@@ -32366,37 +33037,19 @@
           <a:bodyPr/>
           <a:lstStyle/>
           <a:p>
-            <a:r>
-              <a:rPr lang="nl-NL"/>
-              <a:t>Simple component for use in VBCS </a:t>
-            </a:r>
-            <a:r>
-              <a:rPr lang="nl-NL" smtClean="0"/>
-              <a:t>training</a:t>
-            </a:r>
-          </a:p>
-          <a:p>
+            <a:pPr marL="0" indent="0">
+              <a:buNone/>
+            </a:pPr>
             <a:endParaRPr lang="nl-NL"/>
           </a:p>
           <a:p>
-            <a:r>
-              <a:rPr lang="nl-NL"/>
-              <a:t>Expand on this with extra </a:t>
-            </a:r>
-            <a:r>
-              <a:rPr lang="nl-NL" smtClean="0"/>
-              <a:t>assignments</a:t>
-            </a:r>
             <a:endParaRPr lang="nl-NL"/>
           </a:p>
-          <a:p>
-            <a:endParaRPr lang="nl-NL" dirty="0"/>
-          </a:p>
-        </p:txBody>
-      </p:sp>
-      <p:sp>
-        <p:nvSpPr>
-          <p:cNvPr id="4" name="Tijdelijke aanduiding voor voettekst 3"/>
+        </p:txBody>
+      </p:sp>
+      <p:sp>
+        <p:nvSpPr>
+          <p:cNvPr id="4" name="Footer Placeholder 3"/>
           <p:cNvSpPr>
             <a:spLocks noGrp="1"/>
           </p:cNvSpPr>
@@ -32413,10 +33066,34 @@
               <a:rPr lang="fr-FR" smtClean="0"/>
               <a:t>Oracle JET Talent Launch 2018</a:t>
             </a:r>
-            <a:endParaRPr lang="nl-NL"/>
-          </a:p>
-        </p:txBody>
-      </p:sp>
+            <a:endParaRPr lang="nl-NL" dirty="0"/>
+          </a:p>
+        </p:txBody>
+      </p:sp>
+      <p:pic>
+        <p:nvPicPr>
+          <p:cNvPr id="7" name="Picture 6"/>
+          <p:cNvPicPr>
+            <a:picLocks noChangeAspect="1"/>
+          </p:cNvPicPr>
+          <p:nvPr/>
+        </p:nvPicPr>
+        <p:blipFill>
+          <a:blip r:embed="rId2"/>
+          <a:stretch>
+            <a:fillRect/>
+          </a:stretch>
+        </p:blipFill>
+        <p:spPr>
+          <a:xfrm>
+            <a:off x="1485632" y="1123824"/>
+            <a:ext cx="6172735" cy="2895851"/>
+          </a:xfrm>
+          <a:prstGeom prst="rect">
+            <a:avLst/>
+          </a:prstGeom>
+        </p:spPr>
+      </p:pic>
       <p:sp>
         <p:nvSpPr>
           <p:cNvPr id="6" name="Slide Number Placeholder 5"/>
@@ -32443,7 +33120,7 @@
     </p:spTree>
     <p:extLst>
       <p:ext uri="{BB962C8B-B14F-4D97-AF65-F5344CB8AC3E}">
-        <p14:creationId xmlns:p14="http://schemas.microsoft.com/office/powerpoint/2010/main" val="1664126380"/>
+        <p14:creationId xmlns:p14="http://schemas.microsoft.com/office/powerpoint/2010/main" val="1257253234"/>
       </p:ext>
     </p:extLst>
   </p:cSld>

</xml_diff>

<commit_message>
Changes during first training
</commit_message>
<xml_diff>
--- a/OracleJET_TalentLaunch.pptx
+++ b/OracleJET_TalentLaunch.pptx
@@ -10925,6 +10925,10 @@
           <a:bodyPr/>
           <a:lstStyle/>
           <a:p>
+            <a:r>
+              <a:rPr lang="nl-NL"/>
+              <a:t>https://github.com/jeroenRX/AmisJetTraining</a:t>
+            </a:r>
             <a:endParaRPr lang="nl-NL" dirty="0"/>
           </a:p>
         </p:txBody>
@@ -25106,7 +25110,7 @@
                 <a:gridCol w="3048000">
                   <a:extLst>
                     <a:ext uri="{9D8B030D-6E8A-4147-A177-3AD203B41FA5}">
-                      <a16:colId xmlns="" xmlns:a16="http://schemas.microsoft.com/office/drawing/2014/main" val="142243291"/>
+                      <a16:colId xmlns:a16="http://schemas.microsoft.com/office/drawing/2014/main" xmlns="" val="142243291"/>
                     </a:ext>
                   </a:extLst>
                 </a:gridCol>
@@ -25136,7 +25140,7 @@
                 </a:tc>
                 <a:extLst>
                   <a:ext uri="{0D108BD9-81ED-4DB2-BD59-A6C34878D82A}">
-                    <a16:rowId xmlns="" xmlns:a16="http://schemas.microsoft.com/office/drawing/2014/main" val="4057669028"/>
+                    <a16:rowId xmlns:a16="http://schemas.microsoft.com/office/drawing/2014/main" xmlns="" val="4057669028"/>
                   </a:ext>
                 </a:extLst>
               </a:tr>
@@ -25355,7 +25359,7 @@
                 <a:gridCol w="3744911">
                   <a:extLst>
                     <a:ext uri="{9D8B030D-6E8A-4147-A177-3AD203B41FA5}">
-                      <a16:colId xmlns="" xmlns:a16="http://schemas.microsoft.com/office/drawing/2014/main" val="1909856764"/>
+                      <a16:colId xmlns:a16="http://schemas.microsoft.com/office/drawing/2014/main" xmlns="" val="1909856764"/>
                     </a:ext>
                   </a:extLst>
                 </a:gridCol>
@@ -25385,7 +25389,7 @@
                 </a:tc>
                 <a:extLst>
                   <a:ext uri="{0D108BD9-81ED-4DB2-BD59-A6C34878D82A}">
-                    <a16:rowId xmlns="" xmlns:a16="http://schemas.microsoft.com/office/drawing/2014/main" val="2221021415"/>
+                    <a16:rowId xmlns:a16="http://schemas.microsoft.com/office/drawing/2014/main" xmlns="" val="2221021415"/>
                   </a:ext>
                 </a:extLst>
               </a:tr>
@@ -25405,7 +25409,7 @@
                 </a:tc>
                 <a:extLst>
                   <a:ext uri="{0D108BD9-81ED-4DB2-BD59-A6C34878D82A}">
-                    <a16:rowId xmlns="" xmlns:a16="http://schemas.microsoft.com/office/drawing/2014/main" val="3785831217"/>
+                    <a16:rowId xmlns:a16="http://schemas.microsoft.com/office/drawing/2014/main" xmlns="" val="3785831217"/>
                   </a:ext>
                 </a:extLst>
               </a:tr>
@@ -25442,7 +25446,7 @@
                 </a:tc>
                 <a:extLst>
                   <a:ext uri="{0D108BD9-81ED-4DB2-BD59-A6C34878D82A}">
-                    <a16:rowId xmlns="" xmlns:a16="http://schemas.microsoft.com/office/drawing/2014/main" val="1577332384"/>
+                    <a16:rowId xmlns:a16="http://schemas.microsoft.com/office/drawing/2014/main" xmlns="" val="1577332384"/>
                   </a:ext>
                 </a:extLst>
               </a:tr>
@@ -25479,7 +25483,7 @@
                 </a:tc>
                 <a:extLst>
                   <a:ext uri="{0D108BD9-81ED-4DB2-BD59-A6C34878D82A}">
-                    <a16:rowId xmlns="" xmlns:a16="http://schemas.microsoft.com/office/drawing/2014/main" val="2364899398"/>
+                    <a16:rowId xmlns:a16="http://schemas.microsoft.com/office/drawing/2014/main" xmlns="" val="2364899398"/>
                   </a:ext>
                 </a:extLst>
               </a:tr>

</xml_diff>